<commit_message>
Module 5 assignment 3 done.
</commit_message>
<xml_diff>
--- a/module_5_simple_storage_service_s3/module_5_assignment_3/module_5_assignment_3_s3.pptx
+++ b/module_5_simple_storage_service_s3/module_5_assignment_3/module_5_assignment_3_s3.pptx
@@ -11,6 +11,8 @@
     <p:sldId id="258" r:id="rId6"/>
     <p:sldId id="259" r:id="rId7"/>
     <p:sldId id="260" r:id="rId8"/>
+    <p:sldId id="261" r:id="rId9"/>
+    <p:sldId id="262" r:id="rId10"/>
   </p:sldIdLst>
   <p:sldSz cx="10080625" cy="5670550"/>
   <p:notesSz cx="7559675" cy="10691813"/>
@@ -3605,7 +3607,7 @@
         <p:spPr>
           <a:xfrm>
             <a:off x="504000" y="226080"/>
-            <a:ext cx="9070200" cy="945000"/>
+            <a:ext cx="9069840" cy="944640"/>
           </a:xfrm>
           <a:prstGeom prst="rect">
             <a:avLst/>
@@ -3680,7 +3682,7 @@
         <p:spPr>
           <a:xfrm>
             <a:off x="504000" y="1326600"/>
-            <a:ext cx="9070200" cy="3286800"/>
+            <a:ext cx="9069840" cy="3286440"/>
           </a:xfrm>
           <a:prstGeom prst="rect">
             <a:avLst/>
@@ -3707,7 +3709,7 @@
                 </a:solidFill>
                 <a:latin typeface="Arial"/>
               </a:rPr>
-              <a:t>Y</a:t>
+              <a:t>You have been </a:t>
             </a:r>
             <a:r>
               <a:rPr b="0" lang="en-IN" sz="2600" spc="-1" strike="noStrike">
@@ -3716,196 +3718,7 @@
                 </a:solidFill>
                 <a:latin typeface="Arial"/>
               </a:rPr>
-              <a:t>o</a:t>
-            </a:r>
-            <a:r>
-              <a:rPr b="0" lang="en-IN" sz="2600" spc="-1" strike="noStrike">
-                <a:solidFill>
-                  <a:srgbClr val="2a6099"/>
-                </a:solidFill>
-                <a:latin typeface="Arial"/>
-              </a:rPr>
-              <a:t>u</a:t>
-            </a:r>
-            <a:r>
-              <a:rPr b="0" lang="en-IN" sz="2600" spc="-1" strike="noStrike">
-                <a:solidFill>
-                  <a:srgbClr val="2a6099"/>
-                </a:solidFill>
-                <a:latin typeface="Arial"/>
-              </a:rPr>
-              <a:t> </a:t>
-            </a:r>
-            <a:r>
-              <a:rPr b="0" lang="en-IN" sz="2600" spc="-1" strike="noStrike">
-                <a:solidFill>
-                  <a:srgbClr val="2a6099"/>
-                </a:solidFill>
-                <a:latin typeface="Arial"/>
-              </a:rPr>
-              <a:t>h</a:t>
-            </a:r>
-            <a:r>
-              <a:rPr b="0" lang="en-IN" sz="2600" spc="-1" strike="noStrike">
-                <a:solidFill>
-                  <a:srgbClr val="2a6099"/>
-                </a:solidFill>
-                <a:latin typeface="Arial"/>
-              </a:rPr>
-              <a:t>a</a:t>
-            </a:r>
-            <a:r>
-              <a:rPr b="0" lang="en-IN" sz="2600" spc="-1" strike="noStrike">
-                <a:solidFill>
-                  <a:srgbClr val="2a6099"/>
-                </a:solidFill>
-                <a:latin typeface="Arial"/>
-              </a:rPr>
-              <a:t>v</a:t>
-            </a:r>
-            <a:r>
-              <a:rPr b="0" lang="en-IN" sz="2600" spc="-1" strike="noStrike">
-                <a:solidFill>
-                  <a:srgbClr val="2a6099"/>
-                </a:solidFill>
-                <a:latin typeface="Arial"/>
-              </a:rPr>
-              <a:t>e</a:t>
-            </a:r>
-            <a:r>
-              <a:rPr b="0" lang="en-IN" sz="2600" spc="-1" strike="noStrike">
-                <a:solidFill>
-                  <a:srgbClr val="2a6099"/>
-                </a:solidFill>
-                <a:latin typeface="Arial"/>
-              </a:rPr>
-              <a:t> </a:t>
-            </a:r>
-            <a:r>
-              <a:rPr b="0" lang="en-IN" sz="2600" spc="-1" strike="noStrike">
-                <a:solidFill>
-                  <a:srgbClr val="2a6099"/>
-                </a:solidFill>
-                <a:latin typeface="Arial"/>
-              </a:rPr>
-              <a:t>b</a:t>
-            </a:r>
-            <a:r>
-              <a:rPr b="0" lang="en-IN" sz="2600" spc="-1" strike="noStrike">
-                <a:solidFill>
-                  <a:srgbClr val="2a6099"/>
-                </a:solidFill>
-                <a:latin typeface="Arial"/>
-              </a:rPr>
-              <a:t>e</a:t>
-            </a:r>
-            <a:r>
-              <a:rPr b="0" lang="en-IN" sz="2600" spc="-1" strike="noStrike">
-                <a:solidFill>
-                  <a:srgbClr val="2a6099"/>
-                </a:solidFill>
-                <a:latin typeface="Arial"/>
-              </a:rPr>
-              <a:t>e</a:t>
-            </a:r>
-            <a:r>
-              <a:rPr b="0" lang="en-IN" sz="2600" spc="-1" strike="noStrike">
-                <a:solidFill>
-                  <a:srgbClr val="2a6099"/>
-                </a:solidFill>
-                <a:latin typeface="Arial"/>
-              </a:rPr>
-              <a:t>n</a:t>
-            </a:r>
-            <a:r>
-              <a:rPr b="0" lang="en-IN" sz="2600" spc="-1" strike="noStrike">
-                <a:solidFill>
-                  <a:srgbClr val="2a6099"/>
-                </a:solidFill>
-                <a:latin typeface="Arial"/>
-              </a:rPr>
-              <a:t> </a:t>
-            </a:r>
-            <a:r>
-              <a:rPr b="0" lang="en-IN" sz="2600" spc="-1" strike="noStrike">
-                <a:solidFill>
-                  <a:srgbClr val="2a6099"/>
-                </a:solidFill>
-                <a:latin typeface="Arial"/>
-              </a:rPr>
-              <a:t>a</a:t>
-            </a:r>
-            <a:r>
-              <a:rPr b="0" lang="en-IN" sz="2600" spc="-1" strike="noStrike">
-                <a:solidFill>
-                  <a:srgbClr val="2a6099"/>
-                </a:solidFill>
-                <a:latin typeface="Arial"/>
-              </a:rPr>
-              <a:t>s</a:t>
-            </a:r>
-            <a:r>
-              <a:rPr b="0" lang="en-IN" sz="2600" spc="-1" strike="noStrike">
-                <a:solidFill>
-                  <a:srgbClr val="2a6099"/>
-                </a:solidFill>
-                <a:latin typeface="Arial"/>
-              </a:rPr>
-              <a:t>k</a:t>
-            </a:r>
-            <a:r>
-              <a:rPr b="0" lang="en-IN" sz="2600" spc="-1" strike="noStrike">
-                <a:solidFill>
-                  <a:srgbClr val="2a6099"/>
-                </a:solidFill>
-                <a:latin typeface="Arial"/>
-              </a:rPr>
-              <a:t>e</a:t>
-            </a:r>
-            <a:r>
-              <a:rPr b="0" lang="en-IN" sz="2600" spc="-1" strike="noStrike">
-                <a:solidFill>
-                  <a:srgbClr val="2a6099"/>
-                </a:solidFill>
-                <a:latin typeface="Arial"/>
-              </a:rPr>
-              <a:t>d</a:t>
-            </a:r>
-            <a:r>
-              <a:rPr b="0" lang="en-IN" sz="2600" spc="-1" strike="noStrike">
-                <a:solidFill>
-                  <a:srgbClr val="2a6099"/>
-                </a:solidFill>
-                <a:latin typeface="Arial"/>
-              </a:rPr>
-              <a:t> </a:t>
-            </a:r>
-            <a:r>
-              <a:rPr b="0" lang="en-IN" sz="2600" spc="-1" strike="noStrike">
-                <a:solidFill>
-                  <a:srgbClr val="2a6099"/>
-                </a:solidFill>
-                <a:latin typeface="Arial"/>
-              </a:rPr>
-              <a:t>t</a:t>
-            </a:r>
-            <a:r>
-              <a:rPr b="0" lang="en-IN" sz="2600" spc="-1" strike="noStrike">
-                <a:solidFill>
-                  <a:srgbClr val="2a6099"/>
-                </a:solidFill>
-                <a:latin typeface="Arial"/>
-              </a:rPr>
-              <a:t>o</a:t>
-            </a:r>
-            <a:r>
-              <a:rPr b="0" lang="en-IN" sz="2600" spc="-1" strike="noStrike">
-                <a:solidFill>
-                  <a:srgbClr val="2a6099"/>
-                </a:solidFill>
-                <a:latin typeface="Arial"/>
-              </a:rPr>
-              <a:t>:</a:t>
+              <a:t>asked to:</a:t>
             </a:r>
             <a:endParaRPr b="0" lang="en-IN" sz="2600" spc="-1" strike="noStrike">
               <a:latin typeface="Arial"/>
@@ -3942,577 +3755,55 @@
               <a:rPr b="0" lang="en-IN" sz="2600" spc="-1" strike="noStrike">
                 <a:latin typeface="Arial"/>
               </a:rPr>
-              <a:t>N</a:t>
+              <a:t>Now, make </a:t>
             </a:r>
             <a:r>
               <a:rPr b="0" lang="en-IN" sz="2600" spc="-1" strike="noStrike">
                 <a:latin typeface="Arial"/>
               </a:rPr>
-              <a:t>o</a:t>
+              <a:t>the same </a:t>
             </a:r>
             <a:r>
               <a:rPr b="0" lang="en-IN" sz="2600" spc="-1" strike="noStrike">
                 <a:latin typeface="Arial"/>
               </a:rPr>
-              <a:t>w</a:t>
+              <a:t>bucket to be </a:t>
             </a:r>
             <a:r>
               <a:rPr b="0" lang="en-IN" sz="2600" spc="-1" strike="noStrike">
                 <a:latin typeface="Arial"/>
               </a:rPr>
-              <a:t>,</a:t>
+              <a:t>Static website </a:t>
             </a:r>
             <a:r>
               <a:rPr b="0" lang="en-IN" sz="2600" spc="-1" strike="noStrike">
                 <a:latin typeface="Arial"/>
               </a:rPr>
-              <a:t> </a:t>
+              <a:t>host and </a:t>
             </a:r>
             <a:r>
               <a:rPr b="0" lang="en-IN" sz="2600" spc="-1" strike="noStrike">
                 <a:latin typeface="Arial"/>
               </a:rPr>
-              <a:t>m</a:t>
+              <a:t>upload an </a:t>
             </a:r>
             <a:r>
               <a:rPr b="0" lang="en-IN" sz="2600" spc="-1" strike="noStrike">
                 <a:latin typeface="Arial"/>
               </a:rPr>
-              <a:t>a</a:t>
+              <a:t>index.html </a:t>
             </a:r>
             <a:r>
               <a:rPr b="0" lang="en-IN" sz="2600" spc="-1" strike="noStrike">
                 <a:latin typeface="Arial"/>
               </a:rPr>
-              <a:t>k</a:t>
+              <a:t>and error.html </a:t>
             </a:r>
             <a:r>
               <a:rPr b="0" lang="en-IN" sz="2600" spc="-1" strike="noStrike">
                 <a:latin typeface="Arial"/>
               </a:rPr>
-              <a:t>e</a:t>
-            </a:r>
-            <a:r>
-              <a:rPr b="0" lang="en-IN" sz="2600" spc="-1" strike="noStrike">
-                <a:latin typeface="Arial"/>
-              </a:rPr>
-              <a:t> </a:t>
-            </a:r>
-            <a:r>
-              <a:rPr b="0" lang="en-IN" sz="2600" spc="-1" strike="noStrike">
-                <a:latin typeface="Arial"/>
-              </a:rPr>
-              <a:t>t</a:t>
-            </a:r>
-            <a:r>
-              <a:rPr b="0" lang="en-IN" sz="2600" spc="-1" strike="noStrike">
-                <a:latin typeface="Arial"/>
-              </a:rPr>
-              <a:t>h</a:t>
-            </a:r>
-            <a:r>
-              <a:rPr b="0" lang="en-IN" sz="2600" spc="-1" strike="noStrike">
-                <a:latin typeface="Arial"/>
-              </a:rPr>
-              <a:t>e</a:t>
-            </a:r>
-            <a:r>
-              <a:rPr b="0" lang="en-IN" sz="2600" spc="-1" strike="noStrike">
-                <a:latin typeface="Arial"/>
-              </a:rPr>
-              <a:t> </a:t>
-            </a:r>
-            <a:r>
-              <a:rPr b="0" lang="en-IN" sz="2600" spc="-1" strike="noStrike">
-                <a:latin typeface="Arial"/>
-              </a:rPr>
-              <a:t>s</a:t>
-            </a:r>
-            <a:r>
-              <a:rPr b="0" lang="en-IN" sz="2600" spc="-1" strike="noStrike">
-                <a:latin typeface="Arial"/>
-              </a:rPr>
-              <a:t>a</a:t>
-            </a:r>
-            <a:r>
-              <a:rPr b="0" lang="en-IN" sz="2600" spc="-1" strike="noStrike">
-                <a:latin typeface="Arial"/>
-              </a:rPr>
-              <a:t>m</a:t>
-            </a:r>
-            <a:r>
-              <a:rPr b="0" lang="en-IN" sz="2600" spc="-1" strike="noStrike">
-                <a:latin typeface="Arial"/>
-              </a:rPr>
-              <a:t>e</a:t>
-            </a:r>
-            <a:r>
-              <a:rPr b="0" lang="en-IN" sz="2600" spc="-1" strike="noStrike">
-                <a:latin typeface="Arial"/>
-              </a:rPr>
-              <a:t> </a:t>
-            </a:r>
-            <a:r>
-              <a:rPr b="0" lang="en-IN" sz="2600" spc="-1" strike="noStrike">
-                <a:latin typeface="Arial"/>
-              </a:rPr>
-              <a:t>b</a:t>
-            </a:r>
-            <a:r>
-              <a:rPr b="0" lang="en-IN" sz="2600" spc="-1" strike="noStrike">
-                <a:latin typeface="Arial"/>
-              </a:rPr>
-              <a:t>u</a:t>
-            </a:r>
-            <a:r>
-              <a:rPr b="0" lang="en-IN" sz="2600" spc="-1" strike="noStrike">
-                <a:latin typeface="Arial"/>
-              </a:rPr>
-              <a:t>c</a:t>
-            </a:r>
-            <a:r>
-              <a:rPr b="0" lang="en-IN" sz="2600" spc="-1" strike="noStrike">
-                <a:latin typeface="Arial"/>
-              </a:rPr>
-              <a:t>k</a:t>
-            </a:r>
-            <a:r>
-              <a:rPr b="0" lang="en-IN" sz="2600" spc="-1" strike="noStrike">
-                <a:latin typeface="Arial"/>
-              </a:rPr>
-              <a:t>e</a:t>
-            </a:r>
-            <a:r>
-              <a:rPr b="0" lang="en-IN" sz="2600" spc="-1" strike="noStrike">
-                <a:latin typeface="Arial"/>
-              </a:rPr>
-              <a:t>t</a:t>
-            </a:r>
-            <a:r>
-              <a:rPr b="0" lang="en-IN" sz="2600" spc="-1" strike="noStrike">
-                <a:latin typeface="Arial"/>
-              </a:rPr>
-              <a:t> </a:t>
-            </a:r>
-            <a:r>
-              <a:rPr b="0" lang="en-IN" sz="2600" spc="-1" strike="noStrike">
-                <a:latin typeface="Arial"/>
-              </a:rPr>
-              <a:t>t</a:t>
-            </a:r>
-            <a:r>
-              <a:rPr b="0" lang="en-IN" sz="2600" spc="-1" strike="noStrike">
-                <a:latin typeface="Arial"/>
-              </a:rPr>
-              <a:t>o</a:t>
-            </a:r>
-            <a:r>
-              <a:rPr b="0" lang="en-IN" sz="2600" spc="-1" strike="noStrike">
-                <a:latin typeface="Arial"/>
-              </a:rPr>
-              <a:t> </a:t>
-            </a:r>
-            <a:r>
-              <a:rPr b="0" lang="en-IN" sz="2600" spc="-1" strike="noStrike">
-                <a:latin typeface="Arial"/>
-              </a:rPr>
-              <a:t>b</a:t>
-            </a:r>
-            <a:r>
-              <a:rPr b="0" lang="en-IN" sz="2600" spc="-1" strike="noStrike">
-                <a:latin typeface="Arial"/>
-              </a:rPr>
-              <a:t>e</a:t>
-            </a:r>
-            <a:r>
-              <a:rPr b="0" lang="en-IN" sz="2600" spc="-1" strike="noStrike">
-                <a:latin typeface="Arial"/>
-              </a:rPr>
-              <a:t> </a:t>
-            </a:r>
-            <a:r>
-              <a:rPr b="0" lang="en-IN" sz="2600" spc="-1" strike="noStrike">
-                <a:latin typeface="Arial"/>
-              </a:rPr>
-              <a:t>S</a:t>
-            </a:r>
-            <a:r>
-              <a:rPr b="0" lang="en-IN" sz="2600" spc="-1" strike="noStrike">
-                <a:latin typeface="Arial"/>
-              </a:rPr>
-              <a:t>t</a:t>
-            </a:r>
-            <a:r>
-              <a:rPr b="0" lang="en-IN" sz="2600" spc="-1" strike="noStrike">
-                <a:latin typeface="Arial"/>
-              </a:rPr>
-              <a:t>a</a:t>
-            </a:r>
-            <a:r>
-              <a:rPr b="0" lang="en-IN" sz="2600" spc="-1" strike="noStrike">
-                <a:latin typeface="Arial"/>
-              </a:rPr>
-              <a:t>t</a:t>
-            </a:r>
-            <a:r>
-              <a:rPr b="0" lang="en-IN" sz="2600" spc="-1" strike="noStrike">
-                <a:latin typeface="Arial"/>
-              </a:rPr>
-              <a:t>i</a:t>
-            </a:r>
-            <a:r>
-              <a:rPr b="0" lang="en-IN" sz="2600" spc="-1" strike="noStrike">
-                <a:latin typeface="Arial"/>
-              </a:rPr>
-              <a:t>c</a:t>
-            </a:r>
-            <a:r>
-              <a:rPr b="0" lang="en-IN" sz="2600" spc="-1" strike="noStrike">
-                <a:latin typeface="Arial"/>
-              </a:rPr>
-              <a:t> </a:t>
-            </a:r>
-            <a:r>
-              <a:rPr b="0" lang="en-IN" sz="2600" spc="-1" strike="noStrike">
-                <a:latin typeface="Arial"/>
-              </a:rPr>
-              <a:t>w</a:t>
-            </a:r>
-            <a:r>
-              <a:rPr b="0" lang="en-IN" sz="2600" spc="-1" strike="noStrike">
-                <a:latin typeface="Arial"/>
-              </a:rPr>
-              <a:t>e</a:t>
-            </a:r>
-            <a:r>
-              <a:rPr b="0" lang="en-IN" sz="2600" spc="-1" strike="noStrike">
-                <a:latin typeface="Arial"/>
-              </a:rPr>
-              <a:t>b</a:t>
-            </a:r>
-            <a:r>
-              <a:rPr b="0" lang="en-IN" sz="2600" spc="-1" strike="noStrike">
-                <a:latin typeface="Arial"/>
-              </a:rPr>
-              <a:t>s</a:t>
-            </a:r>
-            <a:r>
-              <a:rPr b="0" lang="en-IN" sz="2600" spc="-1" strike="noStrike">
-                <a:latin typeface="Arial"/>
-              </a:rPr>
-              <a:t>i</a:t>
-            </a:r>
-            <a:r>
-              <a:rPr b="0" lang="en-IN" sz="2600" spc="-1" strike="noStrike">
-                <a:latin typeface="Arial"/>
-              </a:rPr>
-              <a:t>t</a:t>
-            </a:r>
-            <a:r>
-              <a:rPr b="0" lang="en-IN" sz="2600" spc="-1" strike="noStrike">
-                <a:latin typeface="Arial"/>
-              </a:rPr>
-              <a:t>e</a:t>
-            </a:r>
-            <a:r>
-              <a:rPr b="0" lang="en-IN" sz="2600" spc="-1" strike="noStrike">
-                <a:latin typeface="Arial"/>
-              </a:rPr>
-              <a:t> </a:t>
-            </a:r>
-            <a:r>
-              <a:rPr b="0" lang="en-IN" sz="2600" spc="-1" strike="noStrike">
-                <a:latin typeface="Arial"/>
-              </a:rPr>
-              <a:t>h</a:t>
-            </a:r>
-            <a:r>
-              <a:rPr b="0" lang="en-IN" sz="2600" spc="-1" strike="noStrike">
-                <a:latin typeface="Arial"/>
-              </a:rPr>
-              <a:t>o</a:t>
-            </a:r>
-            <a:r>
-              <a:rPr b="0" lang="en-IN" sz="2600" spc="-1" strike="noStrike">
-                <a:latin typeface="Arial"/>
-              </a:rPr>
-              <a:t>s</a:t>
-            </a:r>
-            <a:r>
-              <a:rPr b="0" lang="en-IN" sz="2600" spc="-1" strike="noStrike">
-                <a:latin typeface="Arial"/>
-              </a:rPr>
-              <a:t>t</a:t>
-            </a:r>
-            <a:r>
-              <a:rPr b="0" lang="en-IN" sz="2600" spc="-1" strike="noStrike">
-                <a:latin typeface="Arial"/>
-              </a:rPr>
-              <a:t> </a:t>
-            </a:r>
-            <a:r>
-              <a:rPr b="0" lang="en-IN" sz="2600" spc="-1" strike="noStrike">
-                <a:latin typeface="Arial"/>
-              </a:rPr>
-              <a:t>a</a:t>
-            </a:r>
-            <a:r>
-              <a:rPr b="0" lang="en-IN" sz="2600" spc="-1" strike="noStrike">
-                <a:latin typeface="Arial"/>
-              </a:rPr>
-              <a:t>n</a:t>
-            </a:r>
-            <a:r>
-              <a:rPr b="0" lang="en-IN" sz="2600" spc="-1" strike="noStrike">
-                <a:latin typeface="Arial"/>
-              </a:rPr>
-              <a:t>d</a:t>
-            </a:r>
-            <a:r>
-              <a:rPr b="0" lang="en-IN" sz="2600" spc="-1" strike="noStrike">
-                <a:latin typeface="Arial"/>
-              </a:rPr>
-              <a:t> </a:t>
-            </a:r>
-            <a:r>
-              <a:rPr b="0" lang="en-IN" sz="2600" spc="-1" strike="noStrike">
-                <a:latin typeface="Arial"/>
-              </a:rPr>
-              <a:t>u</a:t>
-            </a:r>
-            <a:r>
-              <a:rPr b="0" lang="en-IN" sz="2600" spc="-1" strike="noStrike">
-                <a:latin typeface="Arial"/>
-              </a:rPr>
-              <a:t>p</a:t>
-            </a:r>
-            <a:r>
-              <a:rPr b="0" lang="en-IN" sz="2600" spc="-1" strike="noStrike">
-                <a:latin typeface="Arial"/>
-              </a:rPr>
-              <a:t>l</a:t>
-            </a:r>
-            <a:r>
-              <a:rPr b="0" lang="en-IN" sz="2600" spc="-1" strike="noStrike">
-                <a:latin typeface="Arial"/>
-              </a:rPr>
-              <a:t>o</a:t>
-            </a:r>
-            <a:r>
-              <a:rPr b="0" lang="en-IN" sz="2600" spc="-1" strike="noStrike">
-                <a:latin typeface="Arial"/>
-              </a:rPr>
-              <a:t>a</a:t>
-            </a:r>
-            <a:r>
-              <a:rPr b="0" lang="en-IN" sz="2600" spc="-1" strike="noStrike">
-                <a:latin typeface="Arial"/>
-              </a:rPr>
-              <a:t>d</a:t>
-            </a:r>
-            <a:r>
-              <a:rPr b="0" lang="en-IN" sz="2600" spc="-1" strike="noStrike">
-                <a:latin typeface="Arial"/>
-              </a:rPr>
-              <a:t> </a:t>
-            </a:r>
-            <a:r>
-              <a:rPr b="0" lang="en-IN" sz="2600" spc="-1" strike="noStrike">
-                <a:latin typeface="Arial"/>
-              </a:rPr>
-              <a:t>a</a:t>
-            </a:r>
-            <a:r>
-              <a:rPr b="0" lang="en-IN" sz="2600" spc="-1" strike="noStrike">
-                <a:latin typeface="Arial"/>
-              </a:rPr>
-              <a:t>n</a:t>
-            </a:r>
-            <a:r>
-              <a:rPr b="0" lang="en-IN" sz="2600" spc="-1" strike="noStrike">
-                <a:latin typeface="Arial"/>
-              </a:rPr>
-              <a:t> </a:t>
-            </a:r>
-            <a:r>
-              <a:rPr b="0" lang="en-IN" sz="2600" spc="-1" strike="noStrike">
-                <a:latin typeface="Arial"/>
-              </a:rPr>
-              <a:t>i</a:t>
-            </a:r>
-            <a:r>
-              <a:rPr b="0" lang="en-IN" sz="2600" spc="-1" strike="noStrike">
-                <a:latin typeface="Arial"/>
-              </a:rPr>
-              <a:t>n</a:t>
-            </a:r>
-            <a:r>
-              <a:rPr b="0" lang="en-IN" sz="2600" spc="-1" strike="noStrike">
-                <a:latin typeface="Arial"/>
-              </a:rPr>
-              <a:t>d</a:t>
-            </a:r>
-            <a:r>
-              <a:rPr b="0" lang="en-IN" sz="2600" spc="-1" strike="noStrike">
-                <a:latin typeface="Arial"/>
-              </a:rPr>
-              <a:t>e</a:t>
-            </a:r>
-            <a:r>
-              <a:rPr b="0" lang="en-IN" sz="2600" spc="-1" strike="noStrike">
-                <a:latin typeface="Arial"/>
-              </a:rPr>
-              <a:t>x</a:t>
-            </a:r>
-            <a:r>
-              <a:rPr b="0" lang="en-IN" sz="2600" spc="-1" strike="noStrike">
-                <a:latin typeface="Arial"/>
-              </a:rPr>
-              <a:t>.</a:t>
-            </a:r>
-            <a:r>
-              <a:rPr b="0" lang="en-IN" sz="2600" spc="-1" strike="noStrike">
-                <a:latin typeface="Arial"/>
-              </a:rPr>
-              <a:t>h</a:t>
-            </a:r>
-            <a:r>
-              <a:rPr b="0" lang="en-IN" sz="2600" spc="-1" strike="noStrike">
-                <a:latin typeface="Arial"/>
-              </a:rPr>
-              <a:t>t</a:t>
-            </a:r>
-            <a:r>
-              <a:rPr b="0" lang="en-IN" sz="2600" spc="-1" strike="noStrike">
-                <a:latin typeface="Arial"/>
-              </a:rPr>
-              <a:t>m</a:t>
-            </a:r>
-            <a:r>
-              <a:rPr b="0" lang="en-IN" sz="2600" spc="-1" strike="noStrike">
-                <a:latin typeface="Arial"/>
-              </a:rPr>
-              <a:t>l</a:t>
-            </a:r>
-            <a:r>
-              <a:rPr b="0" lang="en-IN" sz="2600" spc="-1" strike="noStrike">
-                <a:latin typeface="Arial"/>
-              </a:rPr>
-              <a:t> </a:t>
-            </a:r>
-            <a:r>
-              <a:rPr b="0" lang="en-IN" sz="2600" spc="-1" strike="noStrike">
-                <a:latin typeface="Arial"/>
-              </a:rPr>
-              <a:t>a</a:t>
-            </a:r>
-            <a:r>
-              <a:rPr b="0" lang="en-IN" sz="2600" spc="-1" strike="noStrike">
-                <a:latin typeface="Arial"/>
-              </a:rPr>
-              <a:t>n</a:t>
-            </a:r>
-            <a:r>
-              <a:rPr b="0" lang="en-IN" sz="2600" spc="-1" strike="noStrike">
-                <a:latin typeface="Arial"/>
-              </a:rPr>
-              <a:t>d</a:t>
-            </a:r>
-            <a:r>
-              <a:rPr b="0" lang="en-IN" sz="2600" spc="-1" strike="noStrike">
-                <a:latin typeface="Arial"/>
-              </a:rPr>
-              <a:t> </a:t>
-            </a:r>
-            <a:r>
-              <a:rPr b="0" lang="en-IN" sz="2600" spc="-1" strike="noStrike">
-                <a:latin typeface="Arial"/>
-              </a:rPr>
-              <a:t>e</a:t>
-            </a:r>
-            <a:r>
-              <a:rPr b="0" lang="en-IN" sz="2600" spc="-1" strike="noStrike">
-                <a:latin typeface="Arial"/>
-              </a:rPr>
-              <a:t>r</a:t>
-            </a:r>
-            <a:r>
-              <a:rPr b="0" lang="en-IN" sz="2600" spc="-1" strike="noStrike">
-                <a:latin typeface="Arial"/>
-              </a:rPr>
-              <a:t>r</a:t>
-            </a:r>
-            <a:r>
-              <a:rPr b="0" lang="en-IN" sz="2600" spc="-1" strike="noStrike">
-                <a:latin typeface="Arial"/>
-              </a:rPr>
-              <a:t>o</a:t>
-            </a:r>
-            <a:r>
-              <a:rPr b="0" lang="en-IN" sz="2600" spc="-1" strike="noStrike">
-                <a:latin typeface="Arial"/>
-              </a:rPr>
-              <a:t>r</a:t>
-            </a:r>
-            <a:r>
-              <a:rPr b="0" lang="en-IN" sz="2600" spc="-1" strike="noStrike">
-                <a:latin typeface="Arial"/>
-              </a:rPr>
-              <a:t>.</a:t>
-            </a:r>
-            <a:r>
-              <a:rPr b="0" lang="en-IN" sz="2600" spc="-1" strike="noStrike">
-                <a:latin typeface="Arial"/>
-              </a:rPr>
-              <a:t>h</a:t>
-            </a:r>
-            <a:r>
-              <a:rPr b="0" lang="en-IN" sz="2600" spc="-1" strike="noStrike">
-                <a:latin typeface="Arial"/>
-              </a:rPr>
-              <a:t>t</a:t>
-            </a:r>
-            <a:r>
-              <a:rPr b="0" lang="en-IN" sz="2600" spc="-1" strike="noStrike">
-                <a:latin typeface="Arial"/>
-              </a:rPr>
-              <a:t>m</a:t>
-            </a:r>
-            <a:r>
-              <a:rPr b="0" lang="en-IN" sz="2600" spc="-1" strike="noStrike">
-                <a:latin typeface="Arial"/>
-              </a:rPr>
-              <a:t>l</a:t>
-            </a:r>
-            <a:r>
-              <a:rPr b="0" lang="en-IN" sz="2600" spc="-1" strike="noStrike">
-                <a:latin typeface="Arial"/>
-              </a:rPr>
-              <a:t> </a:t>
-            </a:r>
-            <a:r>
-              <a:rPr b="0" lang="en-IN" sz="2600" spc="-1" strike="noStrike">
-                <a:latin typeface="Arial"/>
-              </a:rPr>
-              <a:t>p</a:t>
-            </a:r>
-            <a:r>
-              <a:rPr b="0" lang="en-IN" sz="2600" spc="-1" strike="noStrike">
-                <a:latin typeface="Arial"/>
-              </a:rPr>
-              <a:t>a</a:t>
-            </a:r>
-            <a:r>
-              <a:rPr b="0" lang="en-IN" sz="2600" spc="-1" strike="noStrike">
-                <a:latin typeface="Arial"/>
-              </a:rPr>
-              <a:t>g</a:t>
-            </a:r>
-            <a:r>
-              <a:rPr b="0" lang="en-IN" sz="2600" spc="-1" strike="noStrike">
-                <a:latin typeface="Arial"/>
-              </a:rPr>
-              <a:t>e</a:t>
+              <a:t>page</a:t>
             </a:r>
             <a:endParaRPr b="0" lang="en-IN" sz="2600" spc="-1" strike="noStrike">
               <a:latin typeface="Arial"/>
@@ -4549,253 +3840,25 @@
               <a:rPr b="0" lang="en-IN" sz="2600" spc="-1" strike="noStrike">
                 <a:latin typeface="Arial"/>
               </a:rPr>
-              <a:t>A</a:t>
+              <a:t>Also, add a </a:t>
             </a:r>
             <a:r>
               <a:rPr b="0" lang="en-IN" sz="2600" spc="-1" strike="noStrike">
                 <a:latin typeface="Arial"/>
               </a:rPr>
-              <a:t>l</a:t>
+              <a:t>lifecycle rule </a:t>
             </a:r>
             <a:r>
               <a:rPr b="0" lang="en-IN" sz="2600" spc="-1" strike="noStrike">
                 <a:latin typeface="Arial"/>
               </a:rPr>
-              <a:t>s</a:t>
+              <a:t>for the </a:t>
             </a:r>
             <a:r>
               <a:rPr b="0" lang="en-IN" sz="2600" spc="-1" strike="noStrike">
                 <a:latin typeface="Arial"/>
               </a:rPr>
-              <a:t>o</a:t>
-            </a:r>
-            <a:r>
-              <a:rPr b="0" lang="en-IN" sz="2600" spc="-1" strike="noStrike">
-                <a:latin typeface="Arial"/>
-              </a:rPr>
-              <a:t>,</a:t>
-            </a:r>
-            <a:r>
-              <a:rPr b="0" lang="en-IN" sz="2600" spc="-1" strike="noStrike">
-                <a:latin typeface="Arial"/>
-              </a:rPr>
-              <a:t> </a:t>
-            </a:r>
-            <a:r>
-              <a:rPr b="0" lang="en-IN" sz="2600" spc="-1" strike="noStrike">
-                <a:latin typeface="Arial"/>
-              </a:rPr>
-              <a:t>a</a:t>
-            </a:r>
-            <a:r>
-              <a:rPr b="0" lang="en-IN" sz="2600" spc="-1" strike="noStrike">
-                <a:latin typeface="Arial"/>
-              </a:rPr>
-              <a:t>d</a:t>
-            </a:r>
-            <a:r>
-              <a:rPr b="0" lang="en-IN" sz="2600" spc="-1" strike="noStrike">
-                <a:latin typeface="Arial"/>
-              </a:rPr>
-              <a:t>d</a:t>
-            </a:r>
-            <a:r>
-              <a:rPr b="0" lang="en-IN" sz="2600" spc="-1" strike="noStrike">
-                <a:latin typeface="Arial"/>
-              </a:rPr>
-              <a:t> </a:t>
-            </a:r>
-            <a:r>
-              <a:rPr b="0" lang="en-IN" sz="2600" spc="-1" strike="noStrike">
-                <a:latin typeface="Arial"/>
-              </a:rPr>
-              <a:t>a</a:t>
-            </a:r>
-            <a:r>
-              <a:rPr b="0" lang="en-IN" sz="2600" spc="-1" strike="noStrike">
-                <a:latin typeface="Arial"/>
-              </a:rPr>
-              <a:t> </a:t>
-            </a:r>
-            <a:r>
-              <a:rPr b="0" lang="en-IN" sz="2600" spc="-1" strike="noStrike">
-                <a:latin typeface="Arial"/>
-              </a:rPr>
-              <a:t>l</a:t>
-            </a:r>
-            <a:r>
-              <a:rPr b="0" lang="en-IN" sz="2600" spc="-1" strike="noStrike">
-                <a:latin typeface="Arial"/>
-              </a:rPr>
-              <a:t>i</a:t>
-            </a:r>
-            <a:r>
-              <a:rPr b="0" lang="en-IN" sz="2600" spc="-1" strike="noStrike">
-                <a:latin typeface="Arial"/>
-              </a:rPr>
-              <a:t>f</a:t>
-            </a:r>
-            <a:r>
-              <a:rPr b="0" lang="en-IN" sz="2600" spc="-1" strike="noStrike">
-                <a:latin typeface="Arial"/>
-              </a:rPr>
-              <a:t>e</a:t>
-            </a:r>
-            <a:r>
-              <a:rPr b="0" lang="en-IN" sz="2600" spc="-1" strike="noStrike">
-                <a:latin typeface="Arial"/>
-              </a:rPr>
-              <a:t>c</a:t>
-            </a:r>
-            <a:r>
-              <a:rPr b="0" lang="en-IN" sz="2600" spc="-1" strike="noStrike">
-                <a:latin typeface="Arial"/>
-              </a:rPr>
-              <a:t>y</a:t>
-            </a:r>
-            <a:r>
-              <a:rPr b="0" lang="en-IN" sz="2600" spc="-1" strike="noStrike">
-                <a:latin typeface="Arial"/>
-              </a:rPr>
-              <a:t>c</a:t>
-            </a:r>
-            <a:r>
-              <a:rPr b="0" lang="en-IN" sz="2600" spc="-1" strike="noStrike">
-                <a:latin typeface="Arial"/>
-              </a:rPr>
-              <a:t>l</a:t>
-            </a:r>
-            <a:r>
-              <a:rPr b="0" lang="en-IN" sz="2600" spc="-1" strike="noStrike">
-                <a:latin typeface="Arial"/>
-              </a:rPr>
-              <a:t>e</a:t>
-            </a:r>
-            <a:r>
-              <a:rPr b="0" lang="en-IN" sz="2600" spc="-1" strike="noStrike">
-                <a:latin typeface="Arial"/>
-              </a:rPr>
-              <a:t> </a:t>
-            </a:r>
-            <a:r>
-              <a:rPr b="0" lang="en-IN" sz="2600" spc="-1" strike="noStrike">
-                <a:latin typeface="Arial"/>
-              </a:rPr>
-              <a:t>r</a:t>
-            </a:r>
-            <a:r>
-              <a:rPr b="0" lang="en-IN" sz="2600" spc="-1" strike="noStrike">
-                <a:latin typeface="Arial"/>
-              </a:rPr>
-              <a:t>u</a:t>
-            </a:r>
-            <a:r>
-              <a:rPr b="0" lang="en-IN" sz="2600" spc="-1" strike="noStrike">
-                <a:latin typeface="Arial"/>
-              </a:rPr>
-              <a:t>l</a:t>
-            </a:r>
-            <a:r>
-              <a:rPr b="0" lang="en-IN" sz="2600" spc="-1" strike="noStrike">
-                <a:latin typeface="Arial"/>
-              </a:rPr>
-              <a:t>e</a:t>
-            </a:r>
-            <a:r>
-              <a:rPr b="0" lang="en-IN" sz="2600" spc="-1" strike="noStrike">
-                <a:latin typeface="Arial"/>
-              </a:rPr>
-              <a:t> </a:t>
-            </a:r>
-            <a:r>
-              <a:rPr b="0" lang="en-IN" sz="2600" spc="-1" strike="noStrike">
-                <a:latin typeface="Arial"/>
-              </a:rPr>
-              <a:t>f</a:t>
-            </a:r>
-            <a:r>
-              <a:rPr b="0" lang="en-IN" sz="2600" spc="-1" strike="noStrike">
-                <a:latin typeface="Arial"/>
-              </a:rPr>
-              <a:t>o</a:t>
-            </a:r>
-            <a:r>
-              <a:rPr b="0" lang="en-IN" sz="2600" spc="-1" strike="noStrike">
-                <a:latin typeface="Arial"/>
-              </a:rPr>
-              <a:t>r</a:t>
-            </a:r>
-            <a:r>
-              <a:rPr b="0" lang="en-IN" sz="2600" spc="-1" strike="noStrike">
-                <a:latin typeface="Arial"/>
-              </a:rPr>
-              <a:t> </a:t>
-            </a:r>
-            <a:r>
-              <a:rPr b="0" lang="en-IN" sz="2600" spc="-1" strike="noStrike">
-                <a:latin typeface="Arial"/>
-              </a:rPr>
-              <a:t>t</a:t>
-            </a:r>
-            <a:r>
-              <a:rPr b="0" lang="en-IN" sz="2600" spc="-1" strike="noStrike">
-                <a:latin typeface="Arial"/>
-              </a:rPr>
-              <a:t>h</a:t>
-            </a:r>
-            <a:r>
-              <a:rPr b="0" lang="en-IN" sz="2600" spc="-1" strike="noStrike">
-                <a:latin typeface="Arial"/>
-              </a:rPr>
-              <a:t>e</a:t>
-            </a:r>
-            <a:r>
-              <a:rPr b="0" lang="en-IN" sz="2600" spc="-1" strike="noStrike">
-                <a:latin typeface="Arial"/>
-              </a:rPr>
-              <a:t> </a:t>
-            </a:r>
-            <a:r>
-              <a:rPr b="0" lang="en-IN" sz="2600" spc="-1" strike="noStrike">
-                <a:latin typeface="Arial"/>
-              </a:rPr>
-              <a:t>b</a:t>
-            </a:r>
-            <a:r>
-              <a:rPr b="0" lang="en-IN" sz="2600" spc="-1" strike="noStrike">
-                <a:latin typeface="Arial"/>
-              </a:rPr>
-              <a:t>u</a:t>
-            </a:r>
-            <a:r>
-              <a:rPr b="0" lang="en-IN" sz="2600" spc="-1" strike="noStrike">
-                <a:latin typeface="Arial"/>
-              </a:rPr>
-              <a:t>c</a:t>
-            </a:r>
-            <a:r>
-              <a:rPr b="0" lang="en-IN" sz="2600" spc="-1" strike="noStrike">
-                <a:latin typeface="Arial"/>
-              </a:rPr>
-              <a:t>k</a:t>
-            </a:r>
-            <a:r>
-              <a:rPr b="0" lang="en-IN" sz="2600" spc="-1" strike="noStrike">
-                <a:latin typeface="Arial"/>
-              </a:rPr>
-              <a:t>e</a:t>
-            </a:r>
-            <a:r>
-              <a:rPr b="0" lang="en-IN" sz="2600" spc="-1" strike="noStrike">
-                <a:latin typeface="Arial"/>
-              </a:rPr>
-              <a:t>t</a:t>
-            </a:r>
-            <a:r>
-              <a:rPr b="0" lang="en-IN" sz="2600" spc="-1" strike="noStrike">
-                <a:latin typeface="Arial"/>
-              </a:rPr>
-              <a:t>:</a:t>
+              <a:t>bucket:</a:t>
             </a:r>
             <a:endParaRPr b="0" lang="en-IN" sz="2600" spc="-1" strike="noStrike">
               <a:latin typeface="Arial"/>
@@ -4817,319 +3880,31 @@
               <a:rPr b="0" lang="en-IN" sz="2600" spc="-1" strike="noStrike">
                 <a:latin typeface="Arial"/>
               </a:rPr>
-              <a:t>a</a:t>
+              <a:t>a. Transition </a:t>
             </a:r>
             <a:r>
               <a:rPr b="0" lang="en-IN" sz="2600" spc="-1" strike="noStrike">
                 <a:latin typeface="Arial"/>
               </a:rPr>
-              <a:t>.</a:t>
+              <a:t>from </a:t>
             </a:r>
             <a:r>
               <a:rPr b="0" lang="en-IN" sz="2600" spc="-1" strike="noStrike">
                 <a:latin typeface="Arial"/>
               </a:rPr>
-              <a:t> </a:t>
+              <a:t>Standard to </a:t>
             </a:r>
             <a:r>
               <a:rPr b="0" lang="en-IN" sz="2600" spc="-1" strike="noStrike">
                 <a:latin typeface="Arial"/>
               </a:rPr>
-              <a:t>T</a:t>
+              <a:t>Standard-IA </a:t>
             </a:r>
             <a:r>
               <a:rPr b="0" lang="en-IN" sz="2600" spc="-1" strike="noStrike">
                 <a:latin typeface="Arial"/>
               </a:rPr>
-              <a:t>r</a:t>
-            </a:r>
-            <a:r>
-              <a:rPr b="0" lang="en-IN" sz="2600" spc="-1" strike="noStrike">
-                <a:latin typeface="Arial"/>
-              </a:rPr>
-              <a:t>a</a:t>
-            </a:r>
-            <a:r>
-              <a:rPr b="0" lang="en-IN" sz="2600" spc="-1" strike="noStrike">
-                <a:latin typeface="Arial"/>
-              </a:rPr>
-              <a:t>n</a:t>
-            </a:r>
-            <a:r>
-              <a:rPr b="0" lang="en-IN" sz="2600" spc="-1" strike="noStrike">
-                <a:latin typeface="Arial"/>
-              </a:rPr>
-              <a:t>s</a:t>
-            </a:r>
-            <a:r>
-              <a:rPr b="0" lang="en-IN" sz="2600" spc="-1" strike="noStrike">
-                <a:latin typeface="Arial"/>
-              </a:rPr>
-              <a:t>i</a:t>
-            </a:r>
-            <a:r>
-              <a:rPr b="0" lang="en-IN" sz="2600" spc="-1" strike="noStrike">
-                <a:latin typeface="Arial"/>
-              </a:rPr>
-              <a:t>t</a:t>
-            </a:r>
-            <a:r>
-              <a:rPr b="0" lang="en-IN" sz="2600" spc="-1" strike="noStrike">
-                <a:latin typeface="Arial"/>
-              </a:rPr>
-              <a:t>i</a:t>
-            </a:r>
-            <a:r>
-              <a:rPr b="0" lang="en-IN" sz="2600" spc="-1" strike="noStrike">
-                <a:latin typeface="Arial"/>
-              </a:rPr>
-              <a:t>o</a:t>
-            </a:r>
-            <a:r>
-              <a:rPr b="0" lang="en-IN" sz="2600" spc="-1" strike="noStrike">
-                <a:latin typeface="Arial"/>
-              </a:rPr>
-              <a:t>n</a:t>
-            </a:r>
-            <a:r>
-              <a:rPr b="0" lang="en-IN" sz="2600" spc="-1" strike="noStrike">
-                <a:latin typeface="Arial"/>
-              </a:rPr>
-              <a:t> </a:t>
-            </a:r>
-            <a:r>
-              <a:rPr b="0" lang="en-IN" sz="2600" spc="-1" strike="noStrike">
-                <a:latin typeface="Arial"/>
-              </a:rPr>
-              <a:t>f</a:t>
-            </a:r>
-            <a:r>
-              <a:rPr b="0" lang="en-IN" sz="2600" spc="-1" strike="noStrike">
-                <a:latin typeface="Arial"/>
-              </a:rPr>
-              <a:t>r</a:t>
-            </a:r>
-            <a:r>
-              <a:rPr b="0" lang="en-IN" sz="2600" spc="-1" strike="noStrike">
-                <a:latin typeface="Arial"/>
-              </a:rPr>
-              <a:t>o</a:t>
-            </a:r>
-            <a:r>
-              <a:rPr b="0" lang="en-IN" sz="2600" spc="-1" strike="noStrike">
-                <a:latin typeface="Arial"/>
-              </a:rPr>
-              <a:t>m</a:t>
-            </a:r>
-            <a:r>
-              <a:rPr b="0" lang="en-IN" sz="2600" spc="-1" strike="noStrike">
-                <a:latin typeface="Arial"/>
-              </a:rPr>
-              <a:t> </a:t>
-            </a:r>
-            <a:r>
-              <a:rPr b="0" lang="en-IN" sz="2600" spc="-1" strike="noStrike">
-                <a:latin typeface="Arial"/>
-              </a:rPr>
-              <a:t>S</a:t>
-            </a:r>
-            <a:r>
-              <a:rPr b="0" lang="en-IN" sz="2600" spc="-1" strike="noStrike">
-                <a:latin typeface="Arial"/>
-              </a:rPr>
-              <a:t>t</a:t>
-            </a:r>
-            <a:r>
-              <a:rPr b="0" lang="en-IN" sz="2600" spc="-1" strike="noStrike">
-                <a:latin typeface="Arial"/>
-              </a:rPr>
-              <a:t>a</a:t>
-            </a:r>
-            <a:r>
-              <a:rPr b="0" lang="en-IN" sz="2600" spc="-1" strike="noStrike">
-                <a:latin typeface="Arial"/>
-              </a:rPr>
-              <a:t>n</a:t>
-            </a:r>
-            <a:r>
-              <a:rPr b="0" lang="en-IN" sz="2600" spc="-1" strike="noStrike">
-                <a:latin typeface="Arial"/>
-              </a:rPr>
-              <a:t>d</a:t>
-            </a:r>
-            <a:r>
-              <a:rPr b="0" lang="en-IN" sz="2600" spc="-1" strike="noStrike">
-                <a:latin typeface="Arial"/>
-              </a:rPr>
-              <a:t>a</a:t>
-            </a:r>
-            <a:r>
-              <a:rPr b="0" lang="en-IN" sz="2600" spc="-1" strike="noStrike">
-                <a:latin typeface="Arial"/>
-              </a:rPr>
-              <a:t>r</a:t>
-            </a:r>
-            <a:r>
-              <a:rPr b="0" lang="en-IN" sz="2600" spc="-1" strike="noStrike">
-                <a:latin typeface="Arial"/>
-              </a:rPr>
-              <a:t>d</a:t>
-            </a:r>
-            <a:r>
-              <a:rPr b="0" lang="en-IN" sz="2600" spc="-1" strike="noStrike">
-                <a:latin typeface="Arial"/>
-              </a:rPr>
-              <a:t> </a:t>
-            </a:r>
-            <a:r>
-              <a:rPr b="0" lang="en-IN" sz="2600" spc="-1" strike="noStrike">
-                <a:latin typeface="Arial"/>
-              </a:rPr>
-              <a:t>t</a:t>
-            </a:r>
-            <a:r>
-              <a:rPr b="0" lang="en-IN" sz="2600" spc="-1" strike="noStrike">
-                <a:latin typeface="Arial"/>
-              </a:rPr>
-              <a:t>o</a:t>
-            </a:r>
-            <a:r>
-              <a:rPr b="0" lang="en-IN" sz="2600" spc="-1" strike="noStrike">
-                <a:latin typeface="Arial"/>
-              </a:rPr>
-              <a:t> </a:t>
-            </a:r>
-            <a:r>
-              <a:rPr b="0" lang="en-IN" sz="2600" spc="-1" strike="noStrike">
-                <a:latin typeface="Arial"/>
-              </a:rPr>
-              <a:t>S</a:t>
-            </a:r>
-            <a:r>
-              <a:rPr b="0" lang="en-IN" sz="2600" spc="-1" strike="noStrike">
-                <a:latin typeface="Arial"/>
-              </a:rPr>
-              <a:t>t</a:t>
-            </a:r>
-            <a:r>
-              <a:rPr b="0" lang="en-IN" sz="2600" spc="-1" strike="noStrike">
-                <a:latin typeface="Arial"/>
-              </a:rPr>
-              <a:t>a</a:t>
-            </a:r>
-            <a:r>
-              <a:rPr b="0" lang="en-IN" sz="2600" spc="-1" strike="noStrike">
-                <a:latin typeface="Arial"/>
-              </a:rPr>
-              <a:t>n</a:t>
-            </a:r>
-            <a:r>
-              <a:rPr b="0" lang="en-IN" sz="2600" spc="-1" strike="noStrike">
-                <a:latin typeface="Arial"/>
-              </a:rPr>
-              <a:t>d</a:t>
-            </a:r>
-            <a:r>
-              <a:rPr b="0" lang="en-IN" sz="2600" spc="-1" strike="noStrike">
-                <a:latin typeface="Arial"/>
-              </a:rPr>
-              <a:t>a</a:t>
-            </a:r>
-            <a:r>
-              <a:rPr b="0" lang="en-IN" sz="2600" spc="-1" strike="noStrike">
-                <a:latin typeface="Arial"/>
-              </a:rPr>
-              <a:t>r</a:t>
-            </a:r>
-            <a:r>
-              <a:rPr b="0" lang="en-IN" sz="2600" spc="-1" strike="noStrike">
-                <a:latin typeface="Arial"/>
-              </a:rPr>
-              <a:t>d</a:t>
-            </a:r>
-            <a:r>
-              <a:rPr b="0" lang="en-IN" sz="2600" spc="-1" strike="noStrike">
-                <a:latin typeface="Arial"/>
-              </a:rPr>
-              <a:t>-</a:t>
-            </a:r>
-            <a:r>
-              <a:rPr b="0" lang="en-IN" sz="2600" spc="-1" strike="noStrike">
-                <a:latin typeface="Arial"/>
-              </a:rPr>
-              <a:t>I</a:t>
-            </a:r>
-            <a:r>
-              <a:rPr b="0" lang="en-IN" sz="2600" spc="-1" strike="noStrike">
-                <a:latin typeface="Arial"/>
-              </a:rPr>
-              <a:t>A</a:t>
-            </a:r>
-            <a:r>
-              <a:rPr b="0" lang="en-IN" sz="2600" spc="-1" strike="noStrike">
-                <a:latin typeface="Arial"/>
-              </a:rPr>
-              <a:t> </a:t>
-            </a:r>
-            <a:r>
-              <a:rPr b="0" lang="en-IN" sz="2600" spc="-1" strike="noStrike">
-                <a:latin typeface="Arial"/>
-              </a:rPr>
-              <a:t>i</a:t>
-            </a:r>
-            <a:r>
-              <a:rPr b="0" lang="en-IN" sz="2600" spc="-1" strike="noStrike">
-                <a:latin typeface="Arial"/>
-              </a:rPr>
-              <a:t>n</a:t>
-            </a:r>
-            <a:r>
-              <a:rPr b="0" lang="en-IN" sz="2600" spc="-1" strike="noStrike">
-                <a:latin typeface="Arial"/>
-              </a:rPr>
-              <a:t> </a:t>
-            </a:r>
-            <a:r>
-              <a:rPr b="0" lang="en-IN" sz="2600" spc="-1" strike="noStrike">
-                <a:latin typeface="Arial"/>
-              </a:rPr>
-              <a:t>6</a:t>
-            </a:r>
-            <a:r>
-              <a:rPr b="0" lang="en-IN" sz="2600" spc="-1" strike="noStrike">
-                <a:latin typeface="Arial"/>
-              </a:rPr>
-              <a:t>0</a:t>
-            </a:r>
-            <a:r>
-              <a:rPr b="0" lang="en-IN" sz="2600" spc="-1" strike="noStrike">
-                <a:latin typeface="Arial"/>
-              </a:rPr>
-              <a:t> </a:t>
-            </a:r>
-            <a:r>
-              <a:rPr b="0" lang="en-IN" sz="2600" spc="-1" strike="noStrike">
-                <a:latin typeface="Arial"/>
-              </a:rPr>
-              <a:t>d</a:t>
-            </a:r>
-            <a:r>
-              <a:rPr b="0" lang="en-IN" sz="2600" spc="-1" strike="noStrike">
-                <a:latin typeface="Arial"/>
-              </a:rPr>
-              <a:t>a</a:t>
-            </a:r>
-            <a:r>
-              <a:rPr b="0" lang="en-IN" sz="2600" spc="-1" strike="noStrike">
-                <a:latin typeface="Arial"/>
-              </a:rPr>
-              <a:t>y</a:t>
-            </a:r>
-            <a:r>
-              <a:rPr b="0" lang="en-IN" sz="2600" spc="-1" strike="noStrike">
-                <a:latin typeface="Arial"/>
-              </a:rPr>
-              <a:t>s</a:t>
+              <a:t>in 60 days</a:t>
             </a:r>
             <a:endParaRPr b="0" lang="en-IN" sz="2600" spc="-1" strike="noStrike">
               <a:latin typeface="Arial"/>
@@ -5151,151 +3926,19 @@
               <a:rPr b="0" lang="en-IN" sz="2600" spc="-1" strike="noStrike">
                 <a:latin typeface="Arial"/>
               </a:rPr>
-              <a:t>b</a:t>
+              <a:t>b. </a:t>
             </a:r>
             <a:r>
               <a:rPr b="0" lang="en-IN" sz="2600" spc="-1" strike="noStrike">
                 <a:latin typeface="Arial"/>
               </a:rPr>
-              <a:t>.</a:t>
+              <a:t>Expiration in </a:t>
             </a:r>
             <a:r>
               <a:rPr b="0" lang="en-IN" sz="2600" spc="-1" strike="noStrike">
                 <a:latin typeface="Arial"/>
               </a:rPr>
-              <a:t> </a:t>
-            </a:r>
-            <a:r>
-              <a:rPr b="0" lang="en-IN" sz="2600" spc="-1" strike="noStrike">
-                <a:latin typeface="Arial"/>
-              </a:rPr>
-              <a:t>E</a:t>
-            </a:r>
-            <a:r>
-              <a:rPr b="0" lang="en-IN" sz="2600" spc="-1" strike="noStrike">
-                <a:latin typeface="Arial"/>
-              </a:rPr>
-              <a:t>x</a:t>
-            </a:r>
-            <a:r>
-              <a:rPr b="0" lang="en-IN" sz="2600" spc="-1" strike="noStrike">
-                <a:latin typeface="Arial"/>
-              </a:rPr>
-              <a:t>p</a:t>
-            </a:r>
-            <a:r>
-              <a:rPr b="0" lang="en-IN" sz="2600" spc="-1" strike="noStrike">
-                <a:latin typeface="Arial"/>
-              </a:rPr>
-              <a:t>i</a:t>
-            </a:r>
-            <a:r>
-              <a:rPr b="0" lang="en-IN" sz="2600" spc="-1" strike="noStrike">
-                <a:latin typeface="Arial"/>
-              </a:rPr>
-              <a:t>r</a:t>
-            </a:r>
-            <a:r>
-              <a:rPr b="0" lang="en-IN" sz="2600" spc="-1" strike="noStrike">
-                <a:latin typeface="Arial"/>
-              </a:rPr>
-              <a:t>a</a:t>
-            </a:r>
-            <a:r>
-              <a:rPr b="0" lang="en-IN" sz="2600" spc="-1" strike="noStrike">
-                <a:latin typeface="Arial"/>
-              </a:rPr>
-              <a:t>t</a:t>
-            </a:r>
-            <a:r>
-              <a:rPr b="0" lang="en-IN" sz="2600" spc="-1" strike="noStrike">
-                <a:latin typeface="Arial"/>
-              </a:rPr>
-              <a:t>i</a:t>
-            </a:r>
-            <a:r>
-              <a:rPr b="0" lang="en-IN" sz="2600" spc="-1" strike="noStrike">
-                <a:latin typeface="Arial"/>
-              </a:rPr>
-              <a:t>o</a:t>
-            </a:r>
-            <a:r>
-              <a:rPr b="0" lang="en-IN" sz="2600" spc="-1" strike="noStrike">
-                <a:latin typeface="Arial"/>
-              </a:rPr>
-              <a:t>n</a:t>
-            </a:r>
-            <a:r>
-              <a:rPr b="0" lang="en-IN" sz="2600" spc="-1" strike="noStrike">
-                <a:latin typeface="Arial"/>
-              </a:rPr>
-              <a:t> </a:t>
-            </a:r>
-            <a:r>
-              <a:rPr b="0" lang="en-IN" sz="2600" spc="-1" strike="noStrike">
-                <a:latin typeface="Arial"/>
-              </a:rPr>
-              <a:t>i</a:t>
-            </a:r>
-            <a:r>
-              <a:rPr b="0" lang="en-IN" sz="2600" spc="-1" strike="noStrike">
-                <a:latin typeface="Arial"/>
-              </a:rPr>
-              <a:t>n</a:t>
-            </a:r>
-            <a:r>
-              <a:rPr b="0" lang="en-IN" sz="2600" spc="-1" strike="noStrike">
-                <a:latin typeface="Arial"/>
-              </a:rPr>
-              <a:t> </a:t>
-            </a:r>
-            <a:r>
-              <a:rPr b="0" lang="en-IN" sz="2600" spc="-1" strike="noStrike">
-                <a:latin typeface="Arial"/>
-              </a:rPr>
-              <a:t>2</a:t>
-            </a:r>
-            <a:r>
-              <a:rPr b="0" lang="en-IN" sz="2600" spc="-1" strike="noStrike">
-                <a:latin typeface="Arial"/>
-              </a:rPr>
-              <a:t>0</a:t>
-            </a:r>
-            <a:r>
-              <a:rPr b="0" lang="en-IN" sz="2600" spc="-1" strike="noStrike">
-                <a:latin typeface="Arial"/>
-              </a:rPr>
-              <a:t>0</a:t>
-            </a:r>
-            <a:r>
-              <a:rPr b="0" lang="en-IN" sz="2600" spc="-1" strike="noStrike">
-                <a:latin typeface="Arial"/>
-              </a:rPr>
-              <a:t> </a:t>
-            </a:r>
-            <a:r>
-              <a:rPr b="0" lang="en-IN" sz="2600" spc="-1" strike="noStrike">
-                <a:latin typeface="Arial"/>
-              </a:rPr>
-              <a:t>d</a:t>
-            </a:r>
-            <a:r>
-              <a:rPr b="0" lang="en-IN" sz="2600" spc="-1" strike="noStrike">
-                <a:latin typeface="Arial"/>
-              </a:rPr>
-              <a:t>a</a:t>
-            </a:r>
-            <a:r>
-              <a:rPr b="0" lang="en-IN" sz="2600" spc="-1" strike="noStrike">
-                <a:latin typeface="Arial"/>
-              </a:rPr>
-              <a:t>y</a:t>
-            </a:r>
-            <a:r>
-              <a:rPr b="0" lang="en-IN" sz="2600" spc="-1" strike="noStrike">
-                <a:latin typeface="Arial"/>
-              </a:rPr>
-              <a:t>s</a:t>
+              <a:t>200 days</a:t>
             </a:r>
             <a:endParaRPr b="0" lang="en-IN" sz="2600" spc="-1" strike="noStrike">
               <a:latin typeface="Arial"/>
@@ -5341,13 +3984,13 @@
         </p:nvPicPr>
         <p:blipFill>
           <a:blip r:embed="rId1"/>
-          <a:srcRect l="-324" t="5956" r="244" b="40052"/>
+          <a:srcRect l="-324" t="5956" r="244" b="40045"/>
           <a:stretch/>
         </p:blipFill>
         <p:spPr>
           <a:xfrm>
             <a:off x="0" y="432360"/>
-            <a:ext cx="10079280" cy="3058560"/>
+            <a:ext cx="10078920" cy="3058200"/>
           </a:xfrm>
           <a:prstGeom prst="rect">
             <a:avLst/>
@@ -5372,7 +4015,7 @@
         <p:spPr>
           <a:xfrm>
             <a:off x="1692000" y="2304000"/>
-            <a:ext cx="8279280" cy="1186200"/>
+            <a:ext cx="8278920" cy="1185840"/>
           </a:xfrm>
           <a:prstGeom prst="rect">
             <a:avLst/>
@@ -5391,7 +4034,7 @@
         <p:spPr>
           <a:xfrm>
             <a:off x="540000" y="0"/>
-            <a:ext cx="4858920" cy="358920"/>
+            <a:ext cx="4858560" cy="358560"/>
           </a:xfrm>
           <a:prstGeom prst="wedgeRectCallout">
             <a:avLst>
@@ -5450,7 +4093,7 @@
         <p:spPr>
           <a:xfrm>
             <a:off x="5940720" y="0"/>
-            <a:ext cx="4138920" cy="358920"/>
+            <a:ext cx="4138560" cy="358560"/>
           </a:xfrm>
           <a:prstGeom prst="wedgeRectCallout">
             <a:avLst>
@@ -5509,7 +4152,7 @@
         <p:spPr>
           <a:xfrm>
             <a:off x="1692000" y="3600000"/>
-            <a:ext cx="2843280" cy="395640"/>
+            <a:ext cx="2842920" cy="395280"/>
           </a:xfrm>
           <a:prstGeom prst="wedgeRectCallout">
             <a:avLst>
@@ -5602,7 +4245,7 @@
         <p:spPr>
           <a:xfrm>
             <a:off x="0" y="0"/>
-            <a:ext cx="7740000" cy="2423880"/>
+            <a:ext cx="7739640" cy="2423520"/>
           </a:xfrm>
           <a:prstGeom prst="rect">
             <a:avLst/>
@@ -5623,7 +4266,7 @@
         <p:spPr>
           <a:xfrm>
             <a:off x="1620000" y="1764360"/>
-            <a:ext cx="3923280" cy="395640"/>
+            <a:ext cx="3922920" cy="395280"/>
           </a:xfrm>
           <a:prstGeom prst="wedgeRectCallout">
             <a:avLst>
@@ -5665,17 +4308,7 @@
                 <a:latin typeface="Arial"/>
                 <a:ea typeface="DejaVu Sans"/>
               </a:rPr>
-              <a:t>4. Upload index.html and </a:t>
-            </a:r>
-            <a:r>
-              <a:rPr b="0" lang="en-IN" sz="1800" spc="-1" strike="noStrike">
-                <a:solidFill>
-                  <a:srgbClr val="ffffff"/>
-                </a:solidFill>
-                <a:latin typeface="Arial"/>
-                <a:ea typeface="DejaVu Sans"/>
-              </a:rPr>
-              <a:t>error.html</a:t>
+              <a:t>4. Upload index.html and error.html</a:t>
             </a:r>
             <a:endParaRPr b="0" lang="en-IN" sz="1800" spc="-1" strike="noStrike">
               <a:latin typeface="Arial"/>
@@ -5696,7 +4329,7 @@
         <p:spPr>
           <a:xfrm>
             <a:off x="0" y="3750840"/>
-            <a:ext cx="10080360" cy="1919880"/>
+            <a:ext cx="10080000" cy="1919520"/>
           </a:xfrm>
           <a:prstGeom prst="rect">
             <a:avLst/>
@@ -5717,7 +4350,7 @@
         <p:spPr>
           <a:xfrm>
             <a:off x="1461240" y="3528360"/>
-            <a:ext cx="3923280" cy="395640"/>
+            <a:ext cx="3922920" cy="395280"/>
           </a:xfrm>
           <a:prstGeom prst="wedgeRectCallout">
             <a:avLst>
@@ -5759,307 +4392,7 @@
                 <a:latin typeface="Arial"/>
                 <a:ea typeface="DejaVu Sans"/>
               </a:rPr>
-              <a:t>5</a:t>
-            </a:r>
-            <a:r>
-              <a:rPr b="0" lang="en-IN" sz="1800" spc="-1" strike="noStrike">
-                <a:solidFill>
-                  <a:srgbClr val="ffffff"/>
-                </a:solidFill>
-                <a:latin typeface="Arial"/>
-                <a:ea typeface="DejaVu Sans"/>
-              </a:rPr>
-              <a:t>.</a:t>
-            </a:r>
-            <a:r>
-              <a:rPr b="0" lang="en-IN" sz="1800" spc="-1" strike="noStrike">
-                <a:solidFill>
-                  <a:srgbClr val="ffffff"/>
-                </a:solidFill>
-                <a:latin typeface="Arial"/>
-                <a:ea typeface="DejaVu Sans"/>
-              </a:rPr>
-              <a:t> </a:t>
-            </a:r>
-            <a:r>
-              <a:rPr b="0" lang="en-IN" sz="1800" spc="-1" strike="noStrike">
-                <a:solidFill>
-                  <a:srgbClr val="ffffff"/>
-                </a:solidFill>
-                <a:latin typeface="Arial"/>
-                <a:ea typeface="DejaVu Sans"/>
-              </a:rPr>
-              <a:t>S</a:t>
-            </a:r>
-            <a:r>
-              <a:rPr b="0" lang="en-IN" sz="1800" spc="-1" strike="noStrike">
-                <a:solidFill>
-                  <a:srgbClr val="ffffff"/>
-                </a:solidFill>
-                <a:latin typeface="Arial"/>
-                <a:ea typeface="DejaVu Sans"/>
-              </a:rPr>
-              <a:t>e</a:t>
-            </a:r>
-            <a:r>
-              <a:rPr b="0" lang="en-IN" sz="1800" spc="-1" strike="noStrike">
-                <a:solidFill>
-                  <a:srgbClr val="ffffff"/>
-                </a:solidFill>
-                <a:latin typeface="Arial"/>
-                <a:ea typeface="DejaVu Sans"/>
-              </a:rPr>
-              <a:t>l</a:t>
-            </a:r>
-            <a:r>
-              <a:rPr b="0" lang="en-IN" sz="1800" spc="-1" strike="noStrike">
-                <a:solidFill>
-                  <a:srgbClr val="ffffff"/>
-                </a:solidFill>
-                <a:latin typeface="Arial"/>
-                <a:ea typeface="DejaVu Sans"/>
-              </a:rPr>
-              <a:t>e</a:t>
-            </a:r>
-            <a:r>
-              <a:rPr b="0" lang="en-IN" sz="1800" spc="-1" strike="noStrike">
-                <a:solidFill>
-                  <a:srgbClr val="ffffff"/>
-                </a:solidFill>
-                <a:latin typeface="Arial"/>
-                <a:ea typeface="DejaVu Sans"/>
-              </a:rPr>
-              <a:t>c</a:t>
-            </a:r>
-            <a:r>
-              <a:rPr b="0" lang="en-IN" sz="1800" spc="-1" strike="noStrike">
-                <a:solidFill>
-                  <a:srgbClr val="ffffff"/>
-                </a:solidFill>
-                <a:latin typeface="Arial"/>
-                <a:ea typeface="DejaVu Sans"/>
-              </a:rPr>
-              <a:t>t</a:t>
-            </a:r>
-            <a:r>
-              <a:rPr b="0" lang="en-IN" sz="1800" spc="-1" strike="noStrike">
-                <a:solidFill>
-                  <a:srgbClr val="ffffff"/>
-                </a:solidFill>
-                <a:latin typeface="Arial"/>
-                <a:ea typeface="DejaVu Sans"/>
-              </a:rPr>
-              <a:t> </a:t>
-            </a:r>
-            <a:r>
-              <a:rPr b="0" lang="en-IN" sz="1800" spc="-1" strike="noStrike">
-                <a:solidFill>
-                  <a:srgbClr val="ffffff"/>
-                </a:solidFill>
-                <a:latin typeface="Arial"/>
-                <a:ea typeface="DejaVu Sans"/>
-              </a:rPr>
-              <a:t>b</a:t>
-            </a:r>
-            <a:r>
-              <a:rPr b="0" lang="en-IN" sz="1800" spc="-1" strike="noStrike">
-                <a:solidFill>
-                  <a:srgbClr val="ffffff"/>
-                </a:solidFill>
-                <a:latin typeface="Arial"/>
-                <a:ea typeface="DejaVu Sans"/>
-              </a:rPr>
-              <a:t>u</a:t>
-            </a:r>
-            <a:r>
-              <a:rPr b="0" lang="en-IN" sz="1800" spc="-1" strike="noStrike">
-                <a:solidFill>
-                  <a:srgbClr val="ffffff"/>
-                </a:solidFill>
-                <a:latin typeface="Arial"/>
-                <a:ea typeface="DejaVu Sans"/>
-              </a:rPr>
-              <a:t>c</a:t>
-            </a:r>
-            <a:r>
-              <a:rPr b="0" lang="en-IN" sz="1800" spc="-1" strike="noStrike">
-                <a:solidFill>
-                  <a:srgbClr val="ffffff"/>
-                </a:solidFill>
-                <a:latin typeface="Arial"/>
-                <a:ea typeface="DejaVu Sans"/>
-              </a:rPr>
-              <a:t>k</a:t>
-            </a:r>
-            <a:r>
-              <a:rPr b="0" lang="en-IN" sz="1800" spc="-1" strike="noStrike">
-                <a:solidFill>
-                  <a:srgbClr val="ffffff"/>
-                </a:solidFill>
-                <a:latin typeface="Arial"/>
-                <a:ea typeface="DejaVu Sans"/>
-              </a:rPr>
-              <a:t>e</a:t>
-            </a:r>
-            <a:r>
-              <a:rPr b="0" lang="en-IN" sz="1800" spc="-1" strike="noStrike">
-                <a:solidFill>
-                  <a:srgbClr val="ffffff"/>
-                </a:solidFill>
-                <a:latin typeface="Arial"/>
-                <a:ea typeface="DejaVu Sans"/>
-              </a:rPr>
-              <a:t>t</a:t>
-            </a:r>
-            <a:r>
-              <a:rPr b="0" lang="en-IN" sz="1800" spc="-1" strike="noStrike">
-                <a:solidFill>
-                  <a:srgbClr val="ffffff"/>
-                </a:solidFill>
-                <a:latin typeface="Arial"/>
-                <a:ea typeface="DejaVu Sans"/>
-              </a:rPr>
-              <a:t> </a:t>
-            </a:r>
-            <a:r>
-              <a:rPr b="0" lang="en-IN" sz="1800" spc="-1" strike="noStrike">
-                <a:solidFill>
-                  <a:srgbClr val="ffffff"/>
-                </a:solidFill>
-                <a:latin typeface="Arial"/>
-                <a:ea typeface="DejaVu Sans"/>
-              </a:rPr>
-              <a:t>-</a:t>
-            </a:r>
-            <a:r>
-              <a:rPr b="0" lang="en-IN" sz="1800" spc="-1" strike="noStrike">
-                <a:solidFill>
-                  <a:srgbClr val="ffffff"/>
-                </a:solidFill>
-                <a:latin typeface="Arial"/>
-                <a:ea typeface="DejaVu Sans"/>
-              </a:rPr>
-              <a:t>-</a:t>
-            </a:r>
-            <a:r>
-              <a:rPr b="0" lang="en-IN" sz="1800" spc="-1" strike="noStrike">
-                <a:solidFill>
-                  <a:srgbClr val="ffffff"/>
-                </a:solidFill>
-                <a:latin typeface="Arial"/>
-                <a:ea typeface="DejaVu Sans"/>
-              </a:rPr>
-              <a:t>&gt;</a:t>
-            </a:r>
-            <a:r>
-              <a:rPr b="0" lang="en-IN" sz="1800" spc="-1" strike="noStrike">
-                <a:solidFill>
-                  <a:srgbClr val="ffffff"/>
-                </a:solidFill>
-                <a:latin typeface="Arial"/>
-                <a:ea typeface="DejaVu Sans"/>
-              </a:rPr>
-              <a:t> </a:t>
-            </a:r>
-            <a:r>
-              <a:rPr b="0" lang="en-IN" sz="1800" spc="-1" strike="noStrike">
-                <a:solidFill>
-                  <a:srgbClr val="ffffff"/>
-                </a:solidFill>
-                <a:latin typeface="Arial"/>
-                <a:ea typeface="DejaVu Sans"/>
-              </a:rPr>
-              <a:t>M</a:t>
-            </a:r>
-            <a:r>
-              <a:rPr b="0" lang="en-IN" sz="1800" spc="-1" strike="noStrike">
-                <a:solidFill>
-                  <a:srgbClr val="ffffff"/>
-                </a:solidFill>
-                <a:latin typeface="Arial"/>
-                <a:ea typeface="DejaVu Sans"/>
-              </a:rPr>
-              <a:t>a</a:t>
-            </a:r>
-            <a:r>
-              <a:rPr b="0" lang="en-IN" sz="1800" spc="-1" strike="noStrike">
-                <a:solidFill>
-                  <a:srgbClr val="ffffff"/>
-                </a:solidFill>
-                <a:latin typeface="Arial"/>
-                <a:ea typeface="DejaVu Sans"/>
-              </a:rPr>
-              <a:t>n</a:t>
-            </a:r>
-            <a:r>
-              <a:rPr b="0" lang="en-IN" sz="1800" spc="-1" strike="noStrike">
-                <a:solidFill>
-                  <a:srgbClr val="ffffff"/>
-                </a:solidFill>
-                <a:latin typeface="Arial"/>
-                <a:ea typeface="DejaVu Sans"/>
-              </a:rPr>
-              <a:t>a</a:t>
-            </a:r>
-            <a:r>
-              <a:rPr b="0" lang="en-IN" sz="1800" spc="-1" strike="noStrike">
-                <a:solidFill>
-                  <a:srgbClr val="ffffff"/>
-                </a:solidFill>
-                <a:latin typeface="Arial"/>
-                <a:ea typeface="DejaVu Sans"/>
-              </a:rPr>
-              <a:t>g</a:t>
-            </a:r>
-            <a:r>
-              <a:rPr b="0" lang="en-IN" sz="1800" spc="-1" strike="noStrike">
-                <a:solidFill>
-                  <a:srgbClr val="ffffff"/>
-                </a:solidFill>
-                <a:latin typeface="Arial"/>
-                <a:ea typeface="DejaVu Sans"/>
-              </a:rPr>
-              <a:t>e</a:t>
-            </a:r>
-            <a:r>
-              <a:rPr b="0" lang="en-IN" sz="1800" spc="-1" strike="noStrike">
-                <a:solidFill>
-                  <a:srgbClr val="ffffff"/>
-                </a:solidFill>
-                <a:latin typeface="Arial"/>
-                <a:ea typeface="DejaVu Sans"/>
-              </a:rPr>
-              <a:t>m</a:t>
-            </a:r>
-            <a:r>
-              <a:rPr b="0" lang="en-IN" sz="1800" spc="-1" strike="noStrike">
-                <a:solidFill>
-                  <a:srgbClr val="ffffff"/>
-                </a:solidFill>
-                <a:latin typeface="Arial"/>
-                <a:ea typeface="DejaVu Sans"/>
-              </a:rPr>
-              <a:t>e</a:t>
-            </a:r>
-            <a:r>
-              <a:rPr b="0" lang="en-IN" sz="1800" spc="-1" strike="noStrike">
-                <a:solidFill>
-                  <a:srgbClr val="ffffff"/>
-                </a:solidFill>
-                <a:latin typeface="Arial"/>
-                <a:ea typeface="DejaVu Sans"/>
-              </a:rPr>
-              <a:t>n</a:t>
-            </a:r>
-            <a:r>
-              <a:rPr b="0" lang="en-IN" sz="1800" spc="-1" strike="noStrike">
-                <a:solidFill>
-                  <a:srgbClr val="ffffff"/>
-                </a:solidFill>
-                <a:latin typeface="Arial"/>
-                <a:ea typeface="DejaVu Sans"/>
-              </a:rPr>
-              <a:t>t</a:t>
+              <a:t>5. Select bucket --&gt; Management</a:t>
             </a:r>
             <a:endParaRPr b="0" lang="en-IN" sz="1800" spc="-1" strike="noStrike">
               <a:latin typeface="Arial"/>
@@ -6076,7 +4409,7 @@
         <p:spPr>
           <a:xfrm>
             <a:off x="5796720" y="5220000"/>
-            <a:ext cx="2483280" cy="395640"/>
+            <a:ext cx="2482920" cy="395280"/>
           </a:xfrm>
           <a:prstGeom prst="wedgeRectCallout">
             <a:avLst>
@@ -6118,17 +4451,7 @@
                 <a:latin typeface="Arial"/>
                 <a:ea typeface="DejaVu Sans"/>
               </a:rPr>
-              <a:t>6. Select lifecycle </a:t>
-            </a:r>
-            <a:r>
-              <a:rPr b="0" lang="en-IN" sz="1800" spc="-1" strike="noStrike">
-                <a:solidFill>
-                  <a:srgbClr val="ffffff"/>
-                </a:solidFill>
-                <a:latin typeface="Arial"/>
-                <a:ea typeface="DejaVu Sans"/>
-              </a:rPr>
-              <a:t>role</a:t>
+              <a:t>6. Select lifecycle role</a:t>
             </a:r>
             <a:endParaRPr b="0" lang="en-IN" sz="1800" spc="-1" strike="noStrike">
               <a:latin typeface="Arial"/>
@@ -6179,7 +4502,7 @@
         <p:spPr>
           <a:xfrm>
             <a:off x="0" y="360"/>
-            <a:ext cx="3290040" cy="5670360"/>
+            <a:ext cx="3289680" cy="5670000"/>
           </a:xfrm>
           <a:prstGeom prst="rect">
             <a:avLst/>
@@ -6200,7 +4523,7 @@
         <p:spPr>
           <a:xfrm>
             <a:off x="3348720" y="360000"/>
-            <a:ext cx="2483280" cy="395640"/>
+            <a:ext cx="2482920" cy="395280"/>
           </a:xfrm>
           <a:prstGeom prst="wedgeRectCallout">
             <a:avLst>
@@ -6259,7 +4582,7 @@
         <p:spPr>
           <a:xfrm>
             <a:off x="3348000" y="864360"/>
-            <a:ext cx="2483280" cy="395640"/>
+            <a:ext cx="2482920" cy="395280"/>
           </a:xfrm>
           <a:prstGeom prst="wedgeRectCallout">
             <a:avLst>
@@ -6318,7 +4641,7 @@
         <p:spPr>
           <a:xfrm>
             <a:off x="3342240" y="2132640"/>
-            <a:ext cx="2483280" cy="395640"/>
+            <a:ext cx="2482920" cy="395280"/>
           </a:xfrm>
           <a:prstGeom prst="wedgeRectCallout">
             <a:avLst>
@@ -6360,217 +4683,7 @@
                 <a:latin typeface="Arial"/>
                 <a:ea typeface="DejaVu Sans"/>
               </a:rPr>
-              <a:t>9</a:t>
-            </a:r>
-            <a:r>
-              <a:rPr b="0" lang="en-IN" sz="1800" spc="-1" strike="noStrike">
-                <a:solidFill>
-                  <a:srgbClr val="ffffff"/>
-                </a:solidFill>
-                <a:latin typeface="Arial"/>
-                <a:ea typeface="DejaVu Sans"/>
-              </a:rPr>
-              <a:t>.</a:t>
-            </a:r>
-            <a:r>
-              <a:rPr b="0" lang="en-IN" sz="1800" spc="-1" strike="noStrike">
-                <a:solidFill>
-                  <a:srgbClr val="ffffff"/>
-                </a:solidFill>
-                <a:latin typeface="Arial"/>
-                <a:ea typeface="DejaVu Sans"/>
-              </a:rPr>
-              <a:t> </a:t>
-            </a:r>
-            <a:r>
-              <a:rPr b="0" lang="en-IN" sz="1800" spc="-1" strike="noStrike">
-                <a:solidFill>
-                  <a:srgbClr val="ffffff"/>
-                </a:solidFill>
-                <a:latin typeface="Arial"/>
-                <a:ea typeface="DejaVu Sans"/>
-              </a:rPr>
-              <a:t>C</a:t>
-            </a:r>
-            <a:r>
-              <a:rPr b="0" lang="en-IN" sz="1800" spc="-1" strike="noStrike">
-                <a:solidFill>
-                  <a:srgbClr val="ffffff"/>
-                </a:solidFill>
-                <a:latin typeface="Arial"/>
-                <a:ea typeface="DejaVu Sans"/>
-              </a:rPr>
-              <a:t>h</a:t>
-            </a:r>
-            <a:r>
-              <a:rPr b="0" lang="en-IN" sz="1800" spc="-1" strike="noStrike">
-                <a:solidFill>
-                  <a:srgbClr val="ffffff"/>
-                </a:solidFill>
-                <a:latin typeface="Arial"/>
-                <a:ea typeface="DejaVu Sans"/>
-              </a:rPr>
-              <a:t>o</a:t>
-            </a:r>
-            <a:r>
-              <a:rPr b="0" lang="en-IN" sz="1800" spc="-1" strike="noStrike">
-                <a:solidFill>
-                  <a:srgbClr val="ffffff"/>
-                </a:solidFill>
-                <a:latin typeface="Arial"/>
-                <a:ea typeface="DejaVu Sans"/>
-              </a:rPr>
-              <a:t>o</a:t>
-            </a:r>
-            <a:r>
-              <a:rPr b="0" lang="en-IN" sz="1800" spc="-1" strike="noStrike">
-                <a:solidFill>
-                  <a:srgbClr val="ffffff"/>
-                </a:solidFill>
-                <a:latin typeface="Arial"/>
-                <a:ea typeface="DejaVu Sans"/>
-              </a:rPr>
-              <a:t>s</a:t>
-            </a:r>
-            <a:r>
-              <a:rPr b="0" lang="en-IN" sz="1800" spc="-1" strike="noStrike">
-                <a:solidFill>
-                  <a:srgbClr val="ffffff"/>
-                </a:solidFill>
-                <a:latin typeface="Arial"/>
-                <a:ea typeface="DejaVu Sans"/>
-              </a:rPr>
-              <a:t>e</a:t>
-            </a:r>
-            <a:r>
-              <a:rPr b="0" lang="en-IN" sz="1800" spc="-1" strike="noStrike">
-                <a:solidFill>
-                  <a:srgbClr val="ffffff"/>
-                </a:solidFill>
-                <a:latin typeface="Arial"/>
-                <a:ea typeface="DejaVu Sans"/>
-              </a:rPr>
-              <a:t> </a:t>
-            </a:r>
-            <a:r>
-              <a:rPr b="0" lang="en-IN" sz="1800" spc="-1" strike="noStrike">
-                <a:solidFill>
-                  <a:srgbClr val="ffffff"/>
-                </a:solidFill>
-                <a:latin typeface="Arial"/>
-                <a:ea typeface="DejaVu Sans"/>
-              </a:rPr>
-              <a:t>f</a:t>
-            </a:r>
-            <a:r>
-              <a:rPr b="0" lang="en-IN" sz="1800" spc="-1" strike="noStrike">
-                <a:solidFill>
-                  <a:srgbClr val="ffffff"/>
-                </a:solidFill>
-                <a:latin typeface="Arial"/>
-                <a:ea typeface="DejaVu Sans"/>
-              </a:rPr>
-              <a:t>i</a:t>
-            </a:r>
-            <a:r>
-              <a:rPr b="0" lang="en-IN" sz="1800" spc="-1" strike="noStrike">
-                <a:solidFill>
-                  <a:srgbClr val="ffffff"/>
-                </a:solidFill>
-                <a:latin typeface="Arial"/>
-                <a:ea typeface="DejaVu Sans"/>
-              </a:rPr>
-              <a:t>r</a:t>
-            </a:r>
-            <a:r>
-              <a:rPr b="0" lang="en-IN" sz="1800" spc="-1" strike="noStrike">
-                <a:solidFill>
-                  <a:srgbClr val="ffffff"/>
-                </a:solidFill>
-                <a:latin typeface="Arial"/>
-                <a:ea typeface="DejaVu Sans"/>
-              </a:rPr>
-              <a:t>s</a:t>
-            </a:r>
-            <a:r>
-              <a:rPr b="0" lang="en-IN" sz="1800" spc="-1" strike="noStrike">
-                <a:solidFill>
-                  <a:srgbClr val="ffffff"/>
-                </a:solidFill>
-                <a:latin typeface="Arial"/>
-                <a:ea typeface="DejaVu Sans"/>
-              </a:rPr>
-              <a:t>t</a:t>
-            </a:r>
-            <a:r>
-              <a:rPr b="0" lang="en-IN" sz="1800" spc="-1" strike="noStrike">
-                <a:solidFill>
-                  <a:srgbClr val="ffffff"/>
-                </a:solidFill>
-                <a:latin typeface="Arial"/>
-                <a:ea typeface="DejaVu Sans"/>
-              </a:rPr>
-              <a:t> </a:t>
-            </a:r>
-            <a:r>
-              <a:rPr b="0" lang="en-IN" sz="1800" spc="-1" strike="noStrike">
-                <a:solidFill>
-                  <a:srgbClr val="ffffff"/>
-                </a:solidFill>
-                <a:latin typeface="Arial"/>
-                <a:ea typeface="DejaVu Sans"/>
-              </a:rPr>
-              <a:t>o</a:t>
-            </a:r>
-            <a:r>
-              <a:rPr b="0" lang="en-IN" sz="1800" spc="-1" strike="noStrike">
-                <a:solidFill>
-                  <a:srgbClr val="ffffff"/>
-                </a:solidFill>
-                <a:latin typeface="Arial"/>
-                <a:ea typeface="DejaVu Sans"/>
-              </a:rPr>
-              <a:t>p</a:t>
-            </a:r>
-            <a:r>
-              <a:rPr b="0" lang="en-IN" sz="1800" spc="-1" strike="noStrike">
-                <a:solidFill>
-                  <a:srgbClr val="ffffff"/>
-                </a:solidFill>
-                <a:latin typeface="Arial"/>
-                <a:ea typeface="DejaVu Sans"/>
-              </a:rPr>
-              <a:t>t</a:t>
-            </a:r>
-            <a:r>
-              <a:rPr b="0" lang="en-IN" sz="1800" spc="-1" strike="noStrike">
-                <a:solidFill>
-                  <a:srgbClr val="ffffff"/>
-                </a:solidFill>
-                <a:latin typeface="Arial"/>
-                <a:ea typeface="DejaVu Sans"/>
-              </a:rPr>
-              <a:t>i</a:t>
-            </a:r>
-            <a:r>
-              <a:rPr b="0" lang="en-IN" sz="1800" spc="-1" strike="noStrike">
-                <a:solidFill>
-                  <a:srgbClr val="ffffff"/>
-                </a:solidFill>
-                <a:latin typeface="Arial"/>
-                <a:ea typeface="DejaVu Sans"/>
-              </a:rPr>
-              <a:t>o</a:t>
-            </a:r>
-            <a:r>
-              <a:rPr b="0" lang="en-IN" sz="1800" spc="-1" strike="noStrike">
-                <a:solidFill>
-                  <a:srgbClr val="ffffff"/>
-                </a:solidFill>
-                <a:latin typeface="Arial"/>
-                <a:ea typeface="DejaVu Sans"/>
-              </a:rPr>
-              <a:t>n</a:t>
+              <a:t>9. Choose first option</a:t>
             </a:r>
             <a:endParaRPr b="0" lang="en-IN" sz="1800" spc="-1" strike="noStrike">
               <a:latin typeface="Arial"/>
@@ -6587,7 +4700,7 @@
         <p:spPr>
           <a:xfrm>
             <a:off x="3350160" y="3384360"/>
-            <a:ext cx="2757960" cy="395640"/>
+            <a:ext cx="2757600" cy="395280"/>
           </a:xfrm>
           <a:prstGeom prst="wedgeRectCallout">
             <a:avLst>
@@ -6646,7 +4759,7 @@
         <p:spPr>
           <a:xfrm>
             <a:off x="3362040" y="4464360"/>
-            <a:ext cx="2757960" cy="395640"/>
+            <a:ext cx="2757600" cy="395280"/>
           </a:xfrm>
           <a:prstGeom prst="wedgeRectCallout">
             <a:avLst>
@@ -6705,7 +4818,7 @@
         <p:spPr>
           <a:xfrm>
             <a:off x="3348000" y="5275080"/>
-            <a:ext cx="2757960" cy="395640"/>
+            <a:ext cx="2757600" cy="395280"/>
           </a:xfrm>
           <a:prstGeom prst="wedgeRectCallout">
             <a:avLst>
@@ -6798,7 +4911,7 @@
         <p:spPr>
           <a:xfrm>
             <a:off x="28800" y="720000"/>
-            <a:ext cx="10051200" cy="2523960"/>
+            <a:ext cx="10050840" cy="2523600"/>
           </a:xfrm>
           <a:prstGeom prst="rect">
             <a:avLst/>
@@ -6817,7 +4930,7 @@
         <p:spPr>
           <a:xfrm>
             <a:off x="900000" y="144360"/>
-            <a:ext cx="2757960" cy="395640"/>
+            <a:ext cx="2757600" cy="395280"/>
           </a:xfrm>
           <a:prstGeom prst="wedgeRectCallout">
             <a:avLst>
@@ -6876,7 +4989,7 @@
         <p:spPr>
           <a:xfrm>
             <a:off x="4140000" y="1800000"/>
-            <a:ext cx="3600000" cy="900000"/>
+            <a:ext cx="3599640" cy="899640"/>
           </a:xfrm>
           <a:prstGeom prst="wedgeRectCallout">
             <a:avLst>
@@ -6958,7 +5071,7 @@
                 <a:latin typeface="Arial"/>
                 <a:ea typeface="DejaVu Sans"/>
               </a:rPr>
-              <a:t>Select transition days to be 200</a:t>
+              <a:t>Select expiration days to be 200</a:t>
             </a:r>
             <a:endParaRPr b="0" lang="en-IN" sz="1800" spc="-1" strike="noStrike">
               <a:latin typeface="Arial"/>
@@ -6979,7 +5092,7 @@
         <p:spPr>
           <a:xfrm>
             <a:off x="28800" y="3409920"/>
-            <a:ext cx="5551200" cy="2260800"/>
+            <a:ext cx="5550840" cy="2260440"/>
           </a:xfrm>
           <a:prstGeom prst="rect">
             <a:avLst/>
@@ -7000,7 +5113,7 @@
         <p:spPr>
           <a:xfrm>
             <a:off x="5688000" y="5040000"/>
-            <a:ext cx="3600000" cy="540000"/>
+            <a:ext cx="3599640" cy="539640"/>
           </a:xfrm>
           <a:prstGeom prst="wedgeRectCallout">
             <a:avLst>
@@ -7042,8 +5155,110 @@
                 <a:latin typeface="Arial"/>
                 <a:ea typeface="DejaVu Sans"/>
               </a:rPr>
-              <a:t>15. Verify both </a:t>
-            </a:r>
+              <a:t>15. Verify both lifecycle rules are visible in S3 bucket</a:t>
+            </a:r>
+            <a:endParaRPr b="0" lang="en-IN" sz="1800" spc="-1" strike="noStrike">
+              <a:latin typeface="Arial"/>
+            </a:endParaRPr>
+          </a:p>
+        </p:txBody>
+      </p:sp>
+    </p:spTree>
+  </p:cSld>
+  <mc:AlternateContent>
+    <mc:Choice Requires="p14">
+      <p:transition spd="slow" p14:dur="2000"/>
+    </mc:Choice>
+    <mc:Fallback>
+      <p:transition spd="slow"/>
+    </mc:Fallback>
+  </mc:AlternateContent>
+</p:sld>
+</file>
+
+<file path=ppt/slides/slide6.xml><?xml version="1.0" encoding="utf-8"?>
+<p:sld xmlns:a="http://schemas.openxmlformats.org/drawingml/2006/main" xmlns:p="http://schemas.openxmlformats.org/presentationml/2006/main" xmlns:r="http://schemas.openxmlformats.org/officeDocument/2006/relationships" xmlns:p14="http://schemas.microsoft.com/office/powerpoint/2010/main" xmlns:p15="http://schemas.microsoft.com/office/powerpoint/2012/main" xmlns:mc="http://schemas.openxmlformats.org/markup-compatibility/2006">
+  <p:cSld>
+    <p:spTree>
+      <p:nvGrpSpPr>
+        <p:cNvPr id="1" name=""/>
+        <p:cNvGrpSpPr/>
+        <p:nvPr/>
+      </p:nvGrpSpPr>
+      <p:grpSpPr>
+        <a:xfrm>
+          <a:off x="0" y="0"/>
+          <a:ext cx="0" cy="0"/>
+          <a:chOff x="0" y="0"/>
+          <a:chExt cx="0" cy="0"/>
+        </a:xfrm>
+      </p:grpSpPr>
+      <p:pic>
+        <p:nvPicPr>
+          <p:cNvPr id="100" name="" descr=""/>
+          <p:cNvPicPr/>
+          <p:nvPr/>
+        </p:nvPicPr>
+        <p:blipFill>
+          <a:blip r:embed="rId1"/>
+          <a:stretch/>
+        </p:blipFill>
+        <p:spPr>
+          <a:xfrm>
+            <a:off x="0" y="0"/>
+            <a:ext cx="3398040" cy="5670360"/>
+          </a:xfrm>
+          <a:prstGeom prst="rect">
+            <a:avLst/>
+          </a:prstGeom>
+          <a:ln w="0">
+            <a:noFill/>
+          </a:ln>
+        </p:spPr>
+      </p:pic>
+      <p:sp>
+        <p:nvSpPr>
+          <p:cNvPr id="101" name=""/>
+          <p:cNvSpPr/>
+          <p:nvPr/>
+        </p:nvSpPr>
+        <p:spPr>
+          <a:xfrm>
+            <a:off x="3492720" y="432000"/>
+            <a:ext cx="2482920" cy="395280"/>
+          </a:xfrm>
+          <a:prstGeom prst="wedgeRectCallout">
+            <a:avLst>
+              <a:gd name="adj1" fmla="val -56817"/>
+              <a:gd name="adj2" fmla="val 22090"/>
+            </a:avLst>
+          </a:prstGeom>
+          <a:solidFill>
+            <a:srgbClr val="000000"/>
+          </a:solidFill>
+          <a:ln w="29160">
+            <a:solidFill>
+              <a:srgbClr val="ff0000"/>
+            </a:solidFill>
+            <a:round/>
+          </a:ln>
+        </p:spPr>
+        <p:style>
+          <a:lnRef idx="0"/>
+          <a:fillRef idx="0"/>
+          <a:effectRef idx="0"/>
+          <a:fontRef idx="minor"/>
+        </p:style>
+        <p:txBody>
+          <a:bodyPr lIns="104400" rIns="104400" tIns="59400" bIns="59400" anchor="ctr">
+            <a:noAutofit/>
+          </a:bodyPr>
+          <a:p>
+            <a:pPr algn="ctr">
+              <a:lnSpc>
+                <a:spcPct val="100000"/>
+              </a:lnSpc>
+            </a:pPr>
             <a:r>
               <a:rPr b="0" lang="en-IN" sz="1800" spc="-1" strike="noStrike">
                 <a:solidFill>
@@ -7052,8 +5267,57 @@
                 <a:latin typeface="Arial"/>
                 <a:ea typeface="DejaVu Sans"/>
               </a:rPr>
-              <a:t>lifecycle rules are </a:t>
-            </a:r>
+              <a:t>15. Give a name</a:t>
+            </a:r>
+            <a:endParaRPr b="0" lang="en-IN" sz="1800" spc="-1" strike="noStrike">
+              <a:latin typeface="Arial"/>
+            </a:endParaRPr>
+          </a:p>
+        </p:txBody>
+      </p:sp>
+      <p:sp>
+        <p:nvSpPr>
+          <p:cNvPr id="102" name=""/>
+          <p:cNvSpPr/>
+          <p:nvPr/>
+        </p:nvSpPr>
+        <p:spPr>
+          <a:xfrm>
+            <a:off x="3492000" y="900360"/>
+            <a:ext cx="2482920" cy="395280"/>
+          </a:xfrm>
+          <a:prstGeom prst="wedgeRectCallout">
+            <a:avLst>
+              <a:gd name="adj1" fmla="val -56817"/>
+              <a:gd name="adj2" fmla="val 22090"/>
+            </a:avLst>
+          </a:prstGeom>
+          <a:solidFill>
+            <a:srgbClr val="000000"/>
+          </a:solidFill>
+          <a:ln w="29160">
+            <a:solidFill>
+              <a:srgbClr val="ff0000"/>
+            </a:solidFill>
+            <a:round/>
+          </a:ln>
+        </p:spPr>
+        <p:style>
+          <a:lnRef idx="0"/>
+          <a:fillRef idx="0"/>
+          <a:effectRef idx="0"/>
+          <a:fontRef idx="minor"/>
+        </p:style>
+        <p:txBody>
+          <a:bodyPr lIns="104400" rIns="104400" tIns="59400" bIns="59400" anchor="ctr">
+            <a:noAutofit/>
+          </a:bodyPr>
+          <a:p>
+            <a:pPr algn="ctr">
+              <a:lnSpc>
+                <a:spcPct val="100000"/>
+              </a:lnSpc>
+            </a:pPr>
             <a:r>
               <a:rPr b="0" lang="en-IN" sz="1800" spc="-1" strike="noStrike">
                 <a:solidFill>
@@ -7062,7 +5326,7 @@
                 <a:latin typeface="Arial"/>
                 <a:ea typeface="DejaVu Sans"/>
               </a:rPr>
-              <a:t>visible in S3 bucket</a:t>
+              <a:t>16. Apply to all objects</a:t>
             </a:r>
             <a:endParaRPr b="0" lang="en-IN" sz="1800" spc="-1" strike="noStrike">
               <a:latin typeface="Arial"/>
@@ -7070,6 +5334,374 @@
           </a:p>
         </p:txBody>
       </p:sp>
+      <p:sp>
+        <p:nvSpPr>
+          <p:cNvPr id="103" name=""/>
+          <p:cNvSpPr/>
+          <p:nvPr/>
+        </p:nvSpPr>
+        <p:spPr>
+          <a:xfrm>
+            <a:off x="3486240" y="2456640"/>
+            <a:ext cx="2482920" cy="395280"/>
+          </a:xfrm>
+          <a:prstGeom prst="wedgeRectCallout">
+            <a:avLst>
+              <a:gd name="adj1" fmla="val -56817"/>
+              <a:gd name="adj2" fmla="val 22090"/>
+            </a:avLst>
+          </a:prstGeom>
+          <a:solidFill>
+            <a:srgbClr val="000000"/>
+          </a:solidFill>
+          <a:ln w="29160">
+            <a:solidFill>
+              <a:srgbClr val="ff0000"/>
+            </a:solidFill>
+            <a:round/>
+          </a:ln>
+        </p:spPr>
+        <p:style>
+          <a:lnRef idx="0"/>
+          <a:fillRef idx="0"/>
+          <a:effectRef idx="0"/>
+          <a:fontRef idx="minor"/>
+        </p:style>
+        <p:txBody>
+          <a:bodyPr lIns="104400" rIns="104400" tIns="59400" bIns="59400" anchor="ctr">
+            <a:noAutofit/>
+          </a:bodyPr>
+          <a:p>
+            <a:pPr algn="ctr">
+              <a:lnSpc>
+                <a:spcPct val="100000"/>
+              </a:lnSpc>
+            </a:pPr>
+            <a:r>
+              <a:rPr b="0" lang="en-IN" sz="1800" spc="-1" strike="noStrike">
+                <a:solidFill>
+                  <a:srgbClr val="ffffff"/>
+                </a:solidFill>
+                <a:latin typeface="Arial"/>
+                <a:ea typeface="DejaVu Sans"/>
+              </a:rPr>
+              <a:t>17. Choose 3</a:t>
+            </a:r>
+            <a:r>
+              <a:rPr b="0" lang="en-IN" sz="1800" spc="-1" strike="noStrike" baseline="14000000">
+                <a:solidFill>
+                  <a:srgbClr val="ffffff"/>
+                </a:solidFill>
+                <a:latin typeface="Arial"/>
+                <a:ea typeface="DejaVu Sans"/>
+              </a:rPr>
+              <a:t>rd</a:t>
+            </a:r>
+            <a:r>
+              <a:rPr b="0" lang="en-IN" sz="1800" spc="-1" strike="noStrike">
+                <a:solidFill>
+                  <a:srgbClr val="ffffff"/>
+                </a:solidFill>
+                <a:latin typeface="Arial"/>
+                <a:ea typeface="DejaVu Sans"/>
+              </a:rPr>
+              <a:t> option</a:t>
+            </a:r>
+            <a:endParaRPr b="0" lang="en-IN" sz="1800" spc="-1" strike="noStrike">
+              <a:latin typeface="Arial"/>
+            </a:endParaRPr>
+          </a:p>
+        </p:txBody>
+      </p:sp>
+      <p:sp>
+        <p:nvSpPr>
+          <p:cNvPr id="104" name=""/>
+          <p:cNvSpPr/>
+          <p:nvPr/>
+        </p:nvSpPr>
+        <p:spPr>
+          <a:xfrm>
+            <a:off x="3494160" y="3600360"/>
+            <a:ext cx="2757600" cy="395280"/>
+          </a:xfrm>
+          <a:prstGeom prst="wedgeRectCallout">
+            <a:avLst>
+              <a:gd name="adj1" fmla="val -56817"/>
+              <a:gd name="adj2" fmla="val 22090"/>
+            </a:avLst>
+          </a:prstGeom>
+          <a:solidFill>
+            <a:srgbClr val="000000"/>
+          </a:solidFill>
+          <a:ln w="29160">
+            <a:solidFill>
+              <a:srgbClr val="ff0000"/>
+            </a:solidFill>
+            <a:round/>
+          </a:ln>
+        </p:spPr>
+        <p:style>
+          <a:lnRef idx="0"/>
+          <a:fillRef idx="0"/>
+          <a:effectRef idx="0"/>
+          <a:fontRef idx="minor"/>
+        </p:style>
+        <p:txBody>
+          <a:bodyPr lIns="104400" rIns="104400" tIns="59400" bIns="59400" anchor="ctr">
+            <a:noAutofit/>
+          </a:bodyPr>
+          <a:p>
+            <a:pPr algn="ctr">
+              <a:lnSpc>
+                <a:spcPct val="100000"/>
+              </a:lnSpc>
+            </a:pPr>
+            <a:r>
+              <a:rPr b="0" lang="en-IN" sz="1800" spc="-1" strike="noStrike">
+                <a:solidFill>
+                  <a:srgbClr val="ffffff"/>
+                </a:solidFill>
+                <a:latin typeface="Arial"/>
+                <a:ea typeface="DejaVu Sans"/>
+              </a:rPr>
+              <a:t>18. Choose 200 days</a:t>
+            </a:r>
+            <a:endParaRPr b="0" lang="en-IN" sz="1800" spc="-1" strike="noStrike">
+              <a:latin typeface="Arial"/>
+            </a:endParaRPr>
+          </a:p>
+        </p:txBody>
+      </p:sp>
+      <p:sp>
+        <p:nvSpPr>
+          <p:cNvPr id="105" name=""/>
+          <p:cNvSpPr/>
+          <p:nvPr/>
+        </p:nvSpPr>
+        <p:spPr>
+          <a:xfrm>
+            <a:off x="3506040" y="4392360"/>
+            <a:ext cx="2757600" cy="395280"/>
+          </a:xfrm>
+          <a:prstGeom prst="wedgeRectCallout">
+            <a:avLst>
+              <a:gd name="adj1" fmla="val -56817"/>
+              <a:gd name="adj2" fmla="val 22090"/>
+            </a:avLst>
+          </a:prstGeom>
+          <a:solidFill>
+            <a:srgbClr val="000000"/>
+          </a:solidFill>
+          <a:ln w="29160">
+            <a:solidFill>
+              <a:srgbClr val="ff0000"/>
+            </a:solidFill>
+            <a:round/>
+          </a:ln>
+        </p:spPr>
+        <p:style>
+          <a:lnRef idx="0"/>
+          <a:fillRef idx="0"/>
+          <a:effectRef idx="0"/>
+          <a:fontRef idx="minor"/>
+        </p:style>
+        <p:txBody>
+          <a:bodyPr lIns="104400" rIns="104400" tIns="59400" bIns="59400" anchor="ctr">
+            <a:noAutofit/>
+          </a:bodyPr>
+          <a:p>
+            <a:pPr algn="ctr">
+              <a:lnSpc>
+                <a:spcPct val="100000"/>
+              </a:lnSpc>
+            </a:pPr>
+            <a:r>
+              <a:rPr b="0" lang="en-IN" sz="1800" spc="-1" strike="noStrike">
+                <a:solidFill>
+                  <a:srgbClr val="ffffff"/>
+                </a:solidFill>
+                <a:latin typeface="Arial"/>
+                <a:ea typeface="DejaVu Sans"/>
+              </a:rPr>
+              <a:t>19. Review and adjust</a:t>
+            </a:r>
+            <a:endParaRPr b="0" lang="en-IN" sz="1800" spc="-1" strike="noStrike">
+              <a:latin typeface="Arial"/>
+            </a:endParaRPr>
+          </a:p>
+        </p:txBody>
+      </p:sp>
+      <p:sp>
+        <p:nvSpPr>
+          <p:cNvPr id="106" name=""/>
+          <p:cNvSpPr/>
+          <p:nvPr/>
+        </p:nvSpPr>
+        <p:spPr>
+          <a:xfrm>
+            <a:off x="3492000" y="5275080"/>
+            <a:ext cx="2757600" cy="395280"/>
+          </a:xfrm>
+          <a:prstGeom prst="wedgeRectCallout">
+            <a:avLst>
+              <a:gd name="adj1" fmla="val -54594"/>
+              <a:gd name="adj2" fmla="val 24454"/>
+            </a:avLst>
+          </a:prstGeom>
+          <a:solidFill>
+            <a:srgbClr val="000000"/>
+          </a:solidFill>
+          <a:ln w="29160">
+            <a:solidFill>
+              <a:srgbClr val="ff0000"/>
+            </a:solidFill>
+            <a:round/>
+          </a:ln>
+        </p:spPr>
+        <p:style>
+          <a:lnRef idx="0"/>
+          <a:fillRef idx="0"/>
+          <a:effectRef idx="0"/>
+          <a:fontRef idx="minor"/>
+        </p:style>
+        <p:txBody>
+          <a:bodyPr lIns="104400" rIns="104400" tIns="59400" bIns="59400" anchor="ctr">
+            <a:noAutofit/>
+          </a:bodyPr>
+          <a:p>
+            <a:pPr algn="ctr">
+              <a:lnSpc>
+                <a:spcPct val="100000"/>
+              </a:lnSpc>
+            </a:pPr>
+            <a:r>
+              <a:rPr b="0" lang="en-IN" sz="1800" spc="-1" strike="noStrike">
+                <a:solidFill>
+                  <a:srgbClr val="ffffff"/>
+                </a:solidFill>
+                <a:latin typeface="Arial"/>
+                <a:ea typeface="DejaVu Sans"/>
+              </a:rPr>
+              <a:t>20. Create rule</a:t>
+            </a:r>
+            <a:endParaRPr b="0" lang="en-IN" sz="1800" spc="-1" strike="noStrike">
+              <a:latin typeface="Arial"/>
+            </a:endParaRPr>
+          </a:p>
+        </p:txBody>
+      </p:sp>
+    </p:spTree>
+  </p:cSld>
+  <mc:AlternateContent>
+    <mc:Choice Requires="p14">
+      <p:transition spd="slow" p14:dur="2000"/>
+    </mc:Choice>
+    <mc:Fallback>
+      <p:transition spd="slow"/>
+    </mc:Fallback>
+  </mc:AlternateContent>
+</p:sld>
+</file>
+
+<file path=ppt/slides/slide7.xml><?xml version="1.0" encoding="utf-8"?>
+<p:sld xmlns:a="http://schemas.openxmlformats.org/drawingml/2006/main" xmlns:p="http://schemas.openxmlformats.org/presentationml/2006/main" xmlns:r="http://schemas.openxmlformats.org/officeDocument/2006/relationships" xmlns:p14="http://schemas.microsoft.com/office/powerpoint/2010/main" xmlns:p15="http://schemas.microsoft.com/office/powerpoint/2012/main" xmlns:mc="http://schemas.openxmlformats.org/markup-compatibility/2006">
+  <p:cSld>
+    <p:spTree>
+      <p:nvGrpSpPr>
+        <p:cNvPr id="1" name=""/>
+        <p:cNvGrpSpPr/>
+        <p:nvPr/>
+      </p:nvGrpSpPr>
+      <p:grpSpPr>
+        <a:xfrm>
+          <a:off x="0" y="0"/>
+          <a:ext cx="0" cy="0"/>
+          <a:chOff x="0" y="0"/>
+          <a:chExt cx="0" cy="0"/>
+        </a:xfrm>
+      </p:grpSpPr>
+      <p:sp>
+        <p:nvSpPr>
+          <p:cNvPr id="107" name=""/>
+          <p:cNvSpPr/>
+          <p:nvPr/>
+        </p:nvSpPr>
+        <p:spPr>
+          <a:xfrm>
+            <a:off x="3240360" y="2880360"/>
+            <a:ext cx="3599640" cy="539640"/>
+          </a:xfrm>
+          <a:prstGeom prst="wedgeRectCallout">
+            <a:avLst>
+              <a:gd name="adj1" fmla="val -23400"/>
+              <a:gd name="adj2" fmla="val -81066"/>
+            </a:avLst>
+          </a:prstGeom>
+          <a:solidFill>
+            <a:srgbClr val="000000"/>
+          </a:solidFill>
+          <a:ln w="29160">
+            <a:solidFill>
+              <a:srgbClr val="ff0000"/>
+            </a:solidFill>
+            <a:round/>
+          </a:ln>
+        </p:spPr>
+        <p:style>
+          <a:lnRef idx="0"/>
+          <a:fillRef idx="0"/>
+          <a:effectRef idx="0"/>
+          <a:fontRef idx="minor"/>
+        </p:style>
+        <p:txBody>
+          <a:bodyPr lIns="104400" rIns="104400" tIns="59400" bIns="59400" anchor="ctr">
+            <a:noAutofit/>
+          </a:bodyPr>
+          <a:p>
+            <a:pPr algn="ctr">
+              <a:lnSpc>
+                <a:spcPct val="100000"/>
+              </a:lnSpc>
+            </a:pPr>
+            <a:r>
+              <a:rPr b="0" lang="en-IN" sz="1800" spc="-1" strike="noStrike">
+                <a:solidFill>
+                  <a:srgbClr val="ffffff"/>
+                </a:solidFill>
+                <a:latin typeface="Arial"/>
+                <a:ea typeface="DejaVu Sans"/>
+              </a:rPr>
+              <a:t>21. Verify both lifecycle rules are visible in S3 bucket</a:t>
+            </a:r>
+            <a:endParaRPr b="0" lang="en-IN" sz="1800" spc="-1" strike="noStrike">
+              <a:latin typeface="Arial"/>
+            </a:endParaRPr>
+          </a:p>
+        </p:txBody>
+      </p:sp>
+      <p:pic>
+        <p:nvPicPr>
+          <p:cNvPr id="108" name="" descr=""/>
+          <p:cNvPicPr/>
+          <p:nvPr/>
+        </p:nvPicPr>
+        <p:blipFill>
+          <a:blip r:embed="rId1"/>
+          <a:stretch/>
+        </p:blipFill>
+        <p:spPr>
+          <a:xfrm>
+            <a:off x="0" y="-1800"/>
+            <a:ext cx="10080000" cy="2701800"/>
+          </a:xfrm>
+          <a:prstGeom prst="rect">
+            <a:avLst/>
+          </a:prstGeom>
+          <a:ln w="0">
+            <a:noFill/>
+          </a:ln>
+        </p:spPr>
+      </p:pic>
     </p:spTree>
   </p:cSld>
   <mc:AlternateContent>

</xml_diff>